<commit_message>
First Draft of Slides
</commit_message>
<xml_diff>
--- a/Patterns & Best Practices For Moving From RDBMS to Azure Storage.pptx
+++ b/Patterns & Best Practices For Moving From RDBMS to Azure Storage.pptx
@@ -13,7 +13,26 @@
     <p:sldId id="261" r:id="rId7"/>
     <p:sldId id="262" r:id="rId8"/>
     <p:sldId id="263" r:id="rId9"/>
-    <p:sldId id="264" r:id="rId10"/>
+    <p:sldId id="266" r:id="rId10"/>
+    <p:sldId id="267" r:id="rId11"/>
+    <p:sldId id="264" r:id="rId12"/>
+    <p:sldId id="265" r:id="rId13"/>
+    <p:sldId id="270" r:id="rId14"/>
+    <p:sldId id="268" r:id="rId15"/>
+    <p:sldId id="269" r:id="rId16"/>
+    <p:sldId id="271" r:id="rId17"/>
+    <p:sldId id="272" r:id="rId18"/>
+    <p:sldId id="273" r:id="rId19"/>
+    <p:sldId id="274" r:id="rId20"/>
+    <p:sldId id="275" r:id="rId21"/>
+    <p:sldId id="276" r:id="rId22"/>
+    <p:sldId id="277" r:id="rId23"/>
+    <p:sldId id="278" r:id="rId24"/>
+    <p:sldId id="279" r:id="rId25"/>
+    <p:sldId id="280" r:id="rId26"/>
+    <p:sldId id="281" r:id="rId27"/>
+    <p:sldId id="282" r:id="rId28"/>
+    <p:sldId id="283" r:id="rId29"/>
   </p:sldIdLst>
   <p:sldSz cx="12192000" cy="6858000"/>
   <p:notesSz cx="6858000" cy="9144000"/>
@@ -112,6 +131,11 @@
       </a:defRPr>
     </a:lvl9pPr>
   </p:defaultTextStyle>
+  <p:extLst>
+    <p:ext uri="{EFAFB233-063F-42B5-8137-9DF3F51BA10A}">
+      <p15:sldGuideLst xmlns:p15="http://schemas.microsoft.com/office/powerpoint/2012/main"/>
+    </p:ext>
+  </p:extLst>
 </p:presentation>
 </file>
 
@@ -3057,6 +3081,2159 @@
 </p:sld>
 </file>
 
+<file path=ppt/slides/slide10.xml><?xml version="1.0" encoding="utf-8"?>
+<p:sld xmlns:a="http://schemas.openxmlformats.org/drawingml/2006/main" xmlns:r="http://schemas.openxmlformats.org/officeDocument/2006/relationships" xmlns:p="http://schemas.openxmlformats.org/presentationml/2006/main">
+  <p:cSld>
+    <p:spTree>
+      <p:nvGrpSpPr>
+        <p:cNvPr id="1" name=""/>
+        <p:cNvGrpSpPr/>
+        <p:nvPr/>
+      </p:nvGrpSpPr>
+      <p:grpSpPr>
+        <a:xfrm>
+          <a:off x="0" y="0"/>
+          <a:ext cx="0" cy="0"/>
+          <a:chOff x="0" y="0"/>
+          <a:chExt cx="0" cy="0"/>
+        </a:xfrm>
+      </p:grpSpPr>
+      <p:sp>
+        <p:nvSpPr>
+          <p:cNvPr id="2" name="Title 1"/>
+          <p:cNvSpPr>
+            <a:spLocks noGrp="1"/>
+          </p:cNvSpPr>
+          <p:nvPr>
+            <p:ph type="title"/>
+          </p:nvPr>
+        </p:nvSpPr>
+        <p:spPr/>
+        <p:txBody>
+          <a:bodyPr/>
+          <a:lstStyle/>
+          <a:p>
+            <a:r>
+              <a:rPr lang="en-US" dirty="0" smtClean="0"/>
+              <a:t>SQL Data types</a:t>
+            </a:r>
+            <a:endParaRPr lang="en-US" dirty="0"/>
+          </a:p>
+        </p:txBody>
+      </p:sp>
+      <p:sp>
+        <p:nvSpPr>
+          <p:cNvPr id="3" name="Content Placeholder 2"/>
+          <p:cNvSpPr>
+            <a:spLocks noGrp="1"/>
+          </p:cNvSpPr>
+          <p:nvPr>
+            <p:ph idx="1"/>
+          </p:nvPr>
+        </p:nvSpPr>
+        <p:spPr>
+          <a:xfrm>
+            <a:off x="838200" y="1825625"/>
+            <a:ext cx="2397369" cy="4351338"/>
+          </a:xfrm>
+        </p:spPr>
+        <p:txBody>
+          <a:bodyPr>
+            <a:normAutofit fontScale="77500" lnSpcReduction="20000"/>
+          </a:bodyPr>
+          <a:lstStyle/>
+          <a:p>
+            <a:pPr marL="0" indent="0">
+              <a:buNone/>
+            </a:pPr>
+            <a:r>
+              <a:rPr lang="en-US" dirty="0" err="1" smtClean="0"/>
+              <a:t>Numerics</a:t>
+            </a:r>
+            <a:endParaRPr lang="en-US" dirty="0"/>
+          </a:p>
+          <a:p>
+            <a:pPr marL="285750" indent="-285750"/>
+            <a:r>
+              <a:rPr lang="en-US" dirty="0" err="1"/>
+              <a:t>BigInt</a:t>
+            </a:r>
+            <a:endParaRPr lang="en-US" dirty="0"/>
+          </a:p>
+          <a:p>
+            <a:pPr marL="285750" indent="-285750"/>
+            <a:r>
+              <a:rPr lang="en-US" dirty="0" err="1"/>
+              <a:t>Int</a:t>
+            </a:r>
+            <a:endParaRPr lang="en-US" dirty="0"/>
+          </a:p>
+          <a:p>
+            <a:pPr marL="285750" indent="-285750"/>
+            <a:r>
+              <a:rPr lang="en-US" dirty="0" err="1"/>
+              <a:t>SmallInt</a:t>
+            </a:r>
+            <a:endParaRPr lang="en-US" dirty="0"/>
+          </a:p>
+          <a:p>
+            <a:pPr marL="285750" indent="-285750"/>
+            <a:r>
+              <a:rPr lang="en-US" dirty="0" err="1"/>
+              <a:t>TinyInt</a:t>
+            </a:r>
+            <a:endParaRPr lang="en-US" dirty="0"/>
+          </a:p>
+          <a:p>
+            <a:pPr marL="285750" indent="-285750"/>
+            <a:r>
+              <a:rPr lang="en-US" dirty="0"/>
+              <a:t>Bit</a:t>
+            </a:r>
+          </a:p>
+          <a:p>
+            <a:pPr marL="285750" indent="-285750"/>
+            <a:r>
+              <a:rPr lang="en-US" dirty="0"/>
+              <a:t>Money</a:t>
+            </a:r>
+          </a:p>
+          <a:p>
+            <a:pPr marL="285750" indent="-285750"/>
+            <a:r>
+              <a:rPr lang="en-US" dirty="0" err="1"/>
+              <a:t>SmallMoney</a:t>
+            </a:r>
+            <a:endParaRPr lang="en-US" dirty="0"/>
+          </a:p>
+          <a:p>
+            <a:pPr marL="285750" indent="-285750"/>
+            <a:r>
+              <a:rPr lang="en-US" dirty="0"/>
+              <a:t>Numeric</a:t>
+            </a:r>
+          </a:p>
+          <a:p>
+            <a:pPr marL="285750" indent="-285750"/>
+            <a:r>
+              <a:rPr lang="en-US" dirty="0"/>
+              <a:t>Float</a:t>
+            </a:r>
+          </a:p>
+          <a:p>
+            <a:pPr marL="285750" indent="-285750"/>
+            <a:r>
+              <a:rPr lang="en-US" dirty="0" smtClean="0"/>
+              <a:t>Decimal</a:t>
+            </a:r>
+          </a:p>
+          <a:p>
+            <a:pPr marL="285750" indent="-285750"/>
+            <a:r>
+              <a:rPr lang="en-US" dirty="0" smtClean="0"/>
+              <a:t>Real</a:t>
+            </a:r>
+            <a:endParaRPr lang="en-US" dirty="0"/>
+          </a:p>
+          <a:p>
+            <a:endParaRPr lang="en-US" dirty="0"/>
+          </a:p>
+        </p:txBody>
+      </p:sp>
+      <p:sp>
+        <p:nvSpPr>
+          <p:cNvPr id="4" name="TextBox 3"/>
+          <p:cNvSpPr txBox="1"/>
+          <p:nvPr/>
+        </p:nvSpPr>
+        <p:spPr>
+          <a:xfrm>
+            <a:off x="3357064" y="1690688"/>
+            <a:ext cx="2333958" cy="2585323"/>
+          </a:xfrm>
+          <a:prstGeom prst="rect">
+            <a:avLst/>
+          </a:prstGeom>
+          <a:noFill/>
+        </p:spPr>
+        <p:txBody>
+          <a:bodyPr wrap="square" rtlCol="0">
+            <a:spAutoFit/>
+          </a:bodyPr>
+          <a:lstStyle/>
+          <a:p>
+            <a:r>
+              <a:rPr lang="en-US" dirty="0" smtClean="0"/>
+              <a:t>Date &amp; Time</a:t>
+            </a:r>
+          </a:p>
+          <a:p>
+            <a:pPr marL="285750" indent="-285750">
+              <a:buFont typeface="Arial" panose="020B0604020202020204" pitchFamily="34" charset="0"/>
+              <a:buChar char="•"/>
+            </a:pPr>
+            <a:r>
+              <a:rPr lang="en-US" dirty="0" smtClean="0"/>
+              <a:t>Date</a:t>
+            </a:r>
+          </a:p>
+          <a:p>
+            <a:pPr marL="285750" indent="-285750">
+              <a:buFont typeface="Arial" panose="020B0604020202020204" pitchFamily="34" charset="0"/>
+              <a:buChar char="•"/>
+            </a:pPr>
+            <a:r>
+              <a:rPr lang="en-US" dirty="0" err="1" smtClean="0"/>
+              <a:t>DateTime</a:t>
+            </a:r>
+            <a:endParaRPr lang="en-US" dirty="0" smtClean="0"/>
+          </a:p>
+          <a:p>
+            <a:pPr marL="285750" indent="-285750">
+              <a:buFont typeface="Arial" panose="020B0604020202020204" pitchFamily="34" charset="0"/>
+              <a:buChar char="•"/>
+            </a:pPr>
+            <a:r>
+              <a:rPr lang="en-US" dirty="0" smtClean="0"/>
+              <a:t>DateTime2</a:t>
+            </a:r>
+          </a:p>
+          <a:p>
+            <a:pPr marL="285750" indent="-285750">
+              <a:buFont typeface="Arial" panose="020B0604020202020204" pitchFamily="34" charset="0"/>
+              <a:buChar char="•"/>
+            </a:pPr>
+            <a:r>
+              <a:rPr lang="en-US" dirty="0" err="1" smtClean="0"/>
+              <a:t>DateTimeOffset</a:t>
+            </a:r>
+            <a:endParaRPr lang="en-US" dirty="0" smtClean="0"/>
+          </a:p>
+          <a:p>
+            <a:pPr marL="285750" indent="-285750">
+              <a:buFont typeface="Arial" panose="020B0604020202020204" pitchFamily="34" charset="0"/>
+              <a:buChar char="•"/>
+            </a:pPr>
+            <a:r>
+              <a:rPr lang="en-US" dirty="0" err="1" smtClean="0"/>
+              <a:t>SmallDateTime</a:t>
+            </a:r>
+            <a:endParaRPr lang="en-US" dirty="0" smtClean="0"/>
+          </a:p>
+          <a:p>
+            <a:pPr marL="285750" indent="-285750">
+              <a:buFont typeface="Arial" panose="020B0604020202020204" pitchFamily="34" charset="0"/>
+              <a:buChar char="•"/>
+            </a:pPr>
+            <a:r>
+              <a:rPr lang="en-US" dirty="0" smtClean="0"/>
+              <a:t>Time</a:t>
+            </a:r>
+          </a:p>
+          <a:p>
+            <a:pPr marL="285750" indent="-285750">
+              <a:buFont typeface="Arial" panose="020B0604020202020204" pitchFamily="34" charset="0"/>
+              <a:buChar char="•"/>
+            </a:pPr>
+            <a:endParaRPr lang="en-US" dirty="0" smtClean="0"/>
+          </a:p>
+          <a:p>
+            <a:endParaRPr lang="en-US" dirty="0"/>
+          </a:p>
+        </p:txBody>
+      </p:sp>
+      <p:sp>
+        <p:nvSpPr>
+          <p:cNvPr id="5" name="TextBox 4"/>
+          <p:cNvSpPr txBox="1"/>
+          <p:nvPr/>
+        </p:nvSpPr>
+        <p:spPr>
+          <a:xfrm>
+            <a:off x="3536106" y="4181941"/>
+            <a:ext cx="3504135" cy="2031325"/>
+          </a:xfrm>
+          <a:prstGeom prst="rect">
+            <a:avLst/>
+          </a:prstGeom>
+          <a:noFill/>
+        </p:spPr>
+        <p:txBody>
+          <a:bodyPr wrap="square" rtlCol="0">
+            <a:spAutoFit/>
+          </a:bodyPr>
+          <a:lstStyle/>
+          <a:p>
+            <a:r>
+              <a:rPr lang="en-US" dirty="0" smtClean="0"/>
+              <a:t>Character Strings</a:t>
+            </a:r>
+          </a:p>
+          <a:p>
+            <a:pPr marL="285750" indent="-285750">
+              <a:buFont typeface="Arial" panose="020B0604020202020204" pitchFamily="34" charset="0"/>
+              <a:buChar char="•"/>
+            </a:pPr>
+            <a:r>
+              <a:rPr lang="en-US" dirty="0" smtClean="0"/>
+              <a:t>Char</a:t>
+            </a:r>
+          </a:p>
+          <a:p>
+            <a:pPr marL="285750" indent="-285750">
+              <a:buFont typeface="Arial" panose="020B0604020202020204" pitchFamily="34" charset="0"/>
+              <a:buChar char="•"/>
+            </a:pPr>
+            <a:r>
+              <a:rPr lang="en-US" dirty="0" smtClean="0"/>
+              <a:t>Text</a:t>
+            </a:r>
+          </a:p>
+          <a:p>
+            <a:pPr marL="285750" indent="-285750">
+              <a:buFont typeface="Arial" panose="020B0604020202020204" pitchFamily="34" charset="0"/>
+              <a:buChar char="•"/>
+            </a:pPr>
+            <a:r>
+              <a:rPr lang="en-US" dirty="0" err="1" smtClean="0"/>
+              <a:t>Varchar</a:t>
+            </a:r>
+            <a:endParaRPr lang="en-US" dirty="0" smtClean="0"/>
+          </a:p>
+          <a:p>
+            <a:pPr marL="285750" indent="-285750">
+              <a:buFont typeface="Arial" panose="020B0604020202020204" pitchFamily="34" charset="0"/>
+              <a:buChar char="•"/>
+            </a:pPr>
+            <a:r>
+              <a:rPr lang="en-US" dirty="0" err="1" smtClean="0"/>
+              <a:t>Nchar</a:t>
+            </a:r>
+            <a:endParaRPr lang="en-US" dirty="0" smtClean="0"/>
+          </a:p>
+          <a:p>
+            <a:pPr marL="285750" indent="-285750">
+              <a:buFont typeface="Arial" panose="020B0604020202020204" pitchFamily="34" charset="0"/>
+              <a:buChar char="•"/>
+            </a:pPr>
+            <a:r>
+              <a:rPr lang="en-US" dirty="0" err="1" smtClean="0"/>
+              <a:t>Ntext</a:t>
+            </a:r>
+            <a:endParaRPr lang="en-US" dirty="0" smtClean="0"/>
+          </a:p>
+          <a:p>
+            <a:pPr marL="285750" indent="-285750">
+              <a:buFont typeface="Arial" panose="020B0604020202020204" pitchFamily="34" charset="0"/>
+              <a:buChar char="•"/>
+            </a:pPr>
+            <a:r>
+              <a:rPr lang="en-US" dirty="0" err="1" smtClean="0"/>
+              <a:t>NVarChar</a:t>
+            </a:r>
+            <a:endParaRPr lang="en-US" dirty="0" smtClean="0"/>
+          </a:p>
+        </p:txBody>
+      </p:sp>
+      <p:sp>
+        <p:nvSpPr>
+          <p:cNvPr id="6" name="TextBox 5"/>
+          <p:cNvSpPr txBox="1"/>
+          <p:nvPr/>
+        </p:nvSpPr>
+        <p:spPr>
+          <a:xfrm>
+            <a:off x="5754433" y="1644521"/>
+            <a:ext cx="1758461" cy="1200329"/>
+          </a:xfrm>
+          <a:prstGeom prst="rect">
+            <a:avLst/>
+          </a:prstGeom>
+          <a:noFill/>
+        </p:spPr>
+        <p:txBody>
+          <a:bodyPr wrap="square" rtlCol="0">
+            <a:spAutoFit/>
+          </a:bodyPr>
+          <a:lstStyle/>
+          <a:p>
+            <a:r>
+              <a:rPr lang="en-US" dirty="0" smtClean="0"/>
+              <a:t>Binary Strings</a:t>
+            </a:r>
+          </a:p>
+          <a:p>
+            <a:pPr marL="285750" indent="-285750">
+              <a:buFont typeface="Arial" panose="020B0604020202020204" pitchFamily="34" charset="0"/>
+              <a:buChar char="•"/>
+            </a:pPr>
+            <a:r>
+              <a:rPr lang="en-US" dirty="0" smtClean="0"/>
+              <a:t>Binary</a:t>
+            </a:r>
+          </a:p>
+          <a:p>
+            <a:pPr marL="285750" indent="-285750">
+              <a:buFont typeface="Arial" panose="020B0604020202020204" pitchFamily="34" charset="0"/>
+              <a:buChar char="•"/>
+            </a:pPr>
+            <a:r>
+              <a:rPr lang="en-US" dirty="0" smtClean="0"/>
+              <a:t>Image</a:t>
+            </a:r>
+          </a:p>
+          <a:p>
+            <a:pPr marL="285750" indent="-285750">
+              <a:buFont typeface="Arial" panose="020B0604020202020204" pitchFamily="34" charset="0"/>
+              <a:buChar char="•"/>
+            </a:pPr>
+            <a:r>
+              <a:rPr lang="en-US" dirty="0" err="1" smtClean="0"/>
+              <a:t>VarBinary</a:t>
+            </a:r>
+            <a:endParaRPr lang="en-US" dirty="0"/>
+          </a:p>
+        </p:txBody>
+      </p:sp>
+    </p:spTree>
+    <p:extLst>
+      <p:ext uri="{BB962C8B-B14F-4D97-AF65-F5344CB8AC3E}">
+        <p14:creationId xmlns:p14="http://schemas.microsoft.com/office/powerpoint/2010/main" val="1557970239"/>
+      </p:ext>
+    </p:extLst>
+  </p:cSld>
+  <p:clrMapOvr>
+    <a:masterClrMapping/>
+  </p:clrMapOvr>
+</p:sld>
+</file>
+
+<file path=ppt/slides/slide11.xml><?xml version="1.0" encoding="utf-8"?>
+<p:sld xmlns:a="http://schemas.openxmlformats.org/drawingml/2006/main" xmlns:r="http://schemas.openxmlformats.org/officeDocument/2006/relationships" xmlns:p="http://schemas.openxmlformats.org/presentationml/2006/main">
+  <p:cSld>
+    <p:spTree>
+      <p:nvGrpSpPr>
+        <p:cNvPr id="1" name=""/>
+        <p:cNvGrpSpPr/>
+        <p:nvPr/>
+      </p:nvGrpSpPr>
+      <p:grpSpPr>
+        <a:xfrm>
+          <a:off x="0" y="0"/>
+          <a:ext cx="0" cy="0"/>
+          <a:chOff x="0" y="0"/>
+          <a:chExt cx="0" cy="0"/>
+        </a:xfrm>
+      </p:grpSpPr>
+      <p:sp>
+        <p:nvSpPr>
+          <p:cNvPr id="2" name="Title 1"/>
+          <p:cNvSpPr>
+            <a:spLocks noGrp="1"/>
+          </p:cNvSpPr>
+          <p:nvPr>
+            <p:ph type="title"/>
+          </p:nvPr>
+        </p:nvSpPr>
+        <p:spPr/>
+        <p:txBody>
+          <a:bodyPr/>
+          <a:lstStyle/>
+          <a:p>
+            <a:r>
+              <a:rPr lang="en-US" dirty="0" smtClean="0"/>
+              <a:t>Table Partitions – Why do I care?</a:t>
+            </a:r>
+            <a:endParaRPr lang="en-US" dirty="0"/>
+          </a:p>
+        </p:txBody>
+      </p:sp>
+      <p:sp>
+        <p:nvSpPr>
+          <p:cNvPr id="3" name="Content Placeholder 2"/>
+          <p:cNvSpPr>
+            <a:spLocks noGrp="1"/>
+          </p:cNvSpPr>
+          <p:nvPr>
+            <p:ph idx="1"/>
+          </p:nvPr>
+        </p:nvSpPr>
+        <p:spPr/>
+        <p:txBody>
+          <a:bodyPr/>
+          <a:lstStyle/>
+          <a:p>
+            <a:r>
+              <a:rPr lang="en-US" dirty="0" smtClean="0"/>
+              <a:t>Table Partitions – set of entities with the same partition key value</a:t>
+            </a:r>
+          </a:p>
+          <a:p>
+            <a:r>
+              <a:rPr lang="en-US" dirty="0" smtClean="0"/>
+              <a:t>Single Partition Server handles all requests to a single partition</a:t>
+            </a:r>
+          </a:p>
+          <a:p>
+            <a:r>
+              <a:rPr lang="en-US" dirty="0" smtClean="0"/>
+              <a:t>Entity Group Transaction – Provide Limited form of ACID in a single Partition </a:t>
+            </a:r>
+          </a:p>
+          <a:p>
+            <a:pPr marL="0" indent="0">
+              <a:buNone/>
+            </a:pPr>
+            <a:endParaRPr lang="en-US" dirty="0"/>
+          </a:p>
+          <a:p>
+            <a:r>
+              <a:rPr lang="en-US" dirty="0" smtClean="0"/>
+              <a:t>Partition Size: Too Big, Too Small, Just Right ( Scale </a:t>
+            </a:r>
+            <a:r>
+              <a:rPr lang="en-US" dirty="0" err="1" smtClean="0"/>
+              <a:t>vs</a:t>
+            </a:r>
+            <a:r>
+              <a:rPr lang="en-US" dirty="0" smtClean="0"/>
+              <a:t> Consistency )</a:t>
+            </a:r>
+          </a:p>
+        </p:txBody>
+      </p:sp>
+    </p:spTree>
+    <p:extLst>
+      <p:ext uri="{BB962C8B-B14F-4D97-AF65-F5344CB8AC3E}">
+        <p14:creationId xmlns:p14="http://schemas.microsoft.com/office/powerpoint/2010/main" val="558695033"/>
+      </p:ext>
+    </p:extLst>
+  </p:cSld>
+  <p:clrMapOvr>
+    <a:masterClrMapping/>
+  </p:clrMapOvr>
+</p:sld>
+</file>
+
+<file path=ppt/slides/slide12.xml><?xml version="1.0" encoding="utf-8"?>
+<p:sld xmlns:a="http://schemas.openxmlformats.org/drawingml/2006/main" xmlns:r="http://schemas.openxmlformats.org/officeDocument/2006/relationships" xmlns:p="http://schemas.openxmlformats.org/presentationml/2006/main">
+  <p:cSld>
+    <p:spTree>
+      <p:nvGrpSpPr>
+        <p:cNvPr id="1" name=""/>
+        <p:cNvGrpSpPr/>
+        <p:nvPr/>
+      </p:nvGrpSpPr>
+      <p:grpSpPr>
+        <a:xfrm>
+          <a:off x="0" y="0"/>
+          <a:ext cx="0" cy="0"/>
+          <a:chOff x="0" y="0"/>
+          <a:chExt cx="0" cy="0"/>
+        </a:xfrm>
+      </p:grpSpPr>
+      <p:sp>
+        <p:nvSpPr>
+          <p:cNvPr id="2" name="Title 1"/>
+          <p:cNvSpPr>
+            <a:spLocks noGrp="1"/>
+          </p:cNvSpPr>
+          <p:nvPr>
+            <p:ph type="title"/>
+          </p:nvPr>
+        </p:nvSpPr>
+        <p:spPr/>
+        <p:txBody>
+          <a:bodyPr/>
+          <a:lstStyle/>
+          <a:p>
+            <a:r>
+              <a:rPr lang="en-US" dirty="0" smtClean="0"/>
+              <a:t>Simple Stats Example </a:t>
+            </a:r>
+            <a:endParaRPr lang="en-US" dirty="0"/>
+          </a:p>
+        </p:txBody>
+      </p:sp>
+      <p:sp>
+        <p:nvSpPr>
+          <p:cNvPr id="3" name="Content Placeholder 2"/>
+          <p:cNvSpPr>
+            <a:spLocks noGrp="1"/>
+          </p:cNvSpPr>
+          <p:nvPr>
+            <p:ph idx="1"/>
+          </p:nvPr>
+        </p:nvSpPr>
+        <p:spPr/>
+        <p:txBody>
+          <a:bodyPr/>
+          <a:lstStyle/>
+          <a:p>
+            <a:r>
+              <a:rPr lang="en-US" dirty="0" smtClean="0"/>
+              <a:t>Players interact with your game potentially from multiple devices</a:t>
+            </a:r>
+          </a:p>
+          <a:p>
+            <a:r>
+              <a:rPr lang="en-US" dirty="0" smtClean="0"/>
+              <a:t>Players have a unique Identity</a:t>
+            </a:r>
+          </a:p>
+          <a:p>
+            <a:r>
+              <a:rPr lang="en-US" dirty="0" smtClean="0"/>
+              <a:t>Want to keep statistic totals for players in your game</a:t>
+            </a:r>
+          </a:p>
+          <a:p>
+            <a:r>
+              <a:rPr lang="en-US" dirty="0" smtClean="0"/>
+              <a:t>Also want players to be able to see stats for individual games.</a:t>
+            </a:r>
+          </a:p>
+          <a:p>
+            <a:r>
+              <a:rPr lang="en-US" dirty="0" smtClean="0"/>
+              <a:t>Statistics are uploaded at game end</a:t>
+            </a:r>
+            <a:endParaRPr lang="en-US" dirty="0"/>
+          </a:p>
+        </p:txBody>
+      </p:sp>
+    </p:spTree>
+    <p:extLst>
+      <p:ext uri="{BB962C8B-B14F-4D97-AF65-F5344CB8AC3E}">
+        <p14:creationId xmlns:p14="http://schemas.microsoft.com/office/powerpoint/2010/main" val="3028999884"/>
+      </p:ext>
+    </p:extLst>
+  </p:cSld>
+  <p:clrMapOvr>
+    <a:masterClrMapping/>
+  </p:clrMapOvr>
+</p:sld>
+</file>
+
+<file path=ppt/slides/slide13.xml><?xml version="1.0" encoding="utf-8"?>
+<p:sld xmlns:a="http://schemas.openxmlformats.org/drawingml/2006/main" xmlns:r="http://schemas.openxmlformats.org/officeDocument/2006/relationships" xmlns:p="http://schemas.openxmlformats.org/presentationml/2006/main">
+  <p:cSld>
+    <p:spTree>
+      <p:nvGrpSpPr>
+        <p:cNvPr id="1" name=""/>
+        <p:cNvGrpSpPr/>
+        <p:nvPr/>
+      </p:nvGrpSpPr>
+      <p:grpSpPr>
+        <a:xfrm>
+          <a:off x="0" y="0"/>
+          <a:ext cx="0" cy="0"/>
+          <a:chOff x="0" y="0"/>
+          <a:chExt cx="0" cy="0"/>
+        </a:xfrm>
+      </p:grpSpPr>
+      <p:sp>
+        <p:nvSpPr>
+          <p:cNvPr id="2" name="Title 1"/>
+          <p:cNvSpPr>
+            <a:spLocks noGrp="1"/>
+          </p:cNvSpPr>
+          <p:nvPr>
+            <p:ph type="title"/>
+          </p:nvPr>
+        </p:nvSpPr>
+        <p:spPr>
+          <a:xfrm>
+            <a:off x="256309" y="154110"/>
+            <a:ext cx="10515600" cy="1325563"/>
+          </a:xfrm>
+        </p:spPr>
+        <p:txBody>
+          <a:bodyPr/>
+          <a:lstStyle/>
+          <a:p>
+            <a:r>
+              <a:rPr lang="en-US" dirty="0" smtClean="0"/>
+              <a:t>Simple Stats - Stats Data </a:t>
+            </a:r>
+            <a:endParaRPr lang="en-US" dirty="0"/>
+          </a:p>
+        </p:txBody>
+      </p:sp>
+      <p:sp>
+        <p:nvSpPr>
+          <p:cNvPr id="3" name="Content Placeholder 2"/>
+          <p:cNvSpPr>
+            <a:spLocks noGrp="1"/>
+          </p:cNvSpPr>
+          <p:nvPr>
+            <p:ph idx="1"/>
+          </p:nvPr>
+        </p:nvSpPr>
+        <p:spPr>
+          <a:xfrm>
+            <a:off x="838199" y="1825625"/>
+            <a:ext cx="6758355" cy="4351338"/>
+          </a:xfrm>
+        </p:spPr>
+        <p:txBody>
+          <a:bodyPr>
+            <a:noAutofit/>
+          </a:bodyPr>
+          <a:lstStyle/>
+          <a:p>
+            <a:pPr marL="0" indent="0">
+              <a:buNone/>
+            </a:pPr>
+            <a:r>
+              <a:rPr lang="en-US" sz="1800" dirty="0"/>
+              <a:t> [</a:t>
+            </a:r>
+            <a:r>
+              <a:rPr lang="en-US" sz="1800" dirty="0" err="1"/>
+              <a:t>DataContract</a:t>
+            </a:r>
+            <a:r>
+              <a:rPr lang="en-US" sz="1800" dirty="0"/>
+              <a:t>]</a:t>
+            </a:r>
+          </a:p>
+          <a:p>
+            <a:pPr marL="0" indent="0">
+              <a:buNone/>
+            </a:pPr>
+            <a:r>
+              <a:rPr lang="en-US" sz="1800" dirty="0"/>
+              <a:t>    public class </a:t>
+            </a:r>
+            <a:r>
+              <a:rPr lang="en-US" sz="1800" dirty="0" err="1"/>
+              <a:t>GameData</a:t>
+            </a:r>
+            <a:endParaRPr lang="en-US" sz="1800" dirty="0"/>
+          </a:p>
+          <a:p>
+            <a:pPr marL="0" indent="0">
+              <a:buNone/>
+            </a:pPr>
+            <a:r>
+              <a:rPr lang="en-US" sz="1800" dirty="0"/>
+              <a:t>    {</a:t>
+            </a:r>
+          </a:p>
+          <a:p>
+            <a:pPr marL="0" indent="0">
+              <a:buNone/>
+            </a:pPr>
+            <a:r>
+              <a:rPr lang="en-US" sz="1800" dirty="0"/>
+              <a:t>        [</a:t>
+            </a:r>
+            <a:r>
+              <a:rPr lang="en-US" sz="1800" dirty="0" err="1"/>
+              <a:t>DataMember</a:t>
+            </a:r>
+            <a:r>
+              <a:rPr lang="en-US" sz="1800" dirty="0"/>
+              <a:t>]</a:t>
+            </a:r>
+          </a:p>
+          <a:p>
+            <a:pPr marL="0" indent="0">
+              <a:buNone/>
+            </a:pPr>
+            <a:r>
+              <a:rPr lang="en-US" sz="1800" dirty="0"/>
+              <a:t>        public </a:t>
+            </a:r>
+            <a:r>
+              <a:rPr lang="en-US" sz="1800" dirty="0" err="1"/>
+              <a:t>Guid</a:t>
+            </a:r>
+            <a:r>
+              <a:rPr lang="en-US" sz="1800" dirty="0"/>
+              <a:t> </a:t>
+            </a:r>
+            <a:r>
+              <a:rPr lang="en-US" sz="1800" dirty="0" err="1"/>
+              <a:t>GameId</a:t>
+            </a:r>
+            <a:r>
+              <a:rPr lang="en-US" sz="1800" dirty="0"/>
+              <a:t> { get; set; </a:t>
+            </a:r>
+            <a:r>
+              <a:rPr lang="en-US" sz="1800" dirty="0" smtClean="0"/>
+              <a:t>}</a:t>
+            </a:r>
+            <a:endParaRPr lang="en-US" sz="1800" dirty="0"/>
+          </a:p>
+          <a:p>
+            <a:pPr marL="0" indent="0">
+              <a:buNone/>
+            </a:pPr>
+            <a:r>
+              <a:rPr lang="en-US" sz="1800" dirty="0"/>
+              <a:t>        [</a:t>
+            </a:r>
+            <a:r>
+              <a:rPr lang="en-US" sz="1800" dirty="0" err="1"/>
+              <a:t>DataMember</a:t>
+            </a:r>
+            <a:r>
+              <a:rPr lang="en-US" sz="1800" dirty="0"/>
+              <a:t>]</a:t>
+            </a:r>
+          </a:p>
+          <a:p>
+            <a:pPr marL="0" indent="0">
+              <a:buNone/>
+            </a:pPr>
+            <a:r>
+              <a:rPr lang="en-US" sz="1800" dirty="0"/>
+              <a:t>        public Int32 </a:t>
+            </a:r>
+            <a:r>
+              <a:rPr lang="en-US" sz="1800" dirty="0" err="1"/>
+              <a:t>GameDurationSeconds</a:t>
+            </a:r>
+            <a:r>
+              <a:rPr lang="en-US" sz="1800" dirty="0"/>
+              <a:t> { get; set; </a:t>
+            </a:r>
+            <a:r>
+              <a:rPr lang="en-US" sz="1800" dirty="0" smtClean="0"/>
+              <a:t>}</a:t>
+            </a:r>
+            <a:endParaRPr lang="en-US" sz="1800" dirty="0"/>
+          </a:p>
+          <a:p>
+            <a:pPr marL="0" indent="0">
+              <a:buNone/>
+            </a:pPr>
+            <a:r>
+              <a:rPr lang="en-US" sz="1800" dirty="0"/>
+              <a:t>        [</a:t>
+            </a:r>
+            <a:r>
+              <a:rPr lang="en-US" sz="1800" dirty="0" err="1"/>
+              <a:t>DataMember</a:t>
+            </a:r>
+            <a:r>
+              <a:rPr lang="en-US" sz="1800" dirty="0"/>
+              <a:t>]</a:t>
+            </a:r>
+          </a:p>
+          <a:p>
+            <a:pPr marL="0" indent="0">
+              <a:buNone/>
+            </a:pPr>
+            <a:r>
+              <a:rPr lang="en-US" sz="1800" dirty="0"/>
+              <a:t>        public Dictionary&lt;Int64, </a:t>
+            </a:r>
+            <a:r>
+              <a:rPr lang="en-US" sz="1800" dirty="0" err="1"/>
+              <a:t>PlayerGameData</a:t>
+            </a:r>
+            <a:r>
+              <a:rPr lang="en-US" sz="1800" dirty="0"/>
+              <a:t>&gt; </a:t>
+            </a:r>
+            <a:r>
+              <a:rPr lang="en-US" sz="1800" dirty="0" err="1"/>
+              <a:t>PlayerData</a:t>
+            </a:r>
+            <a:r>
+              <a:rPr lang="en-US" sz="1800" dirty="0"/>
+              <a:t> { get; set; }</a:t>
+            </a:r>
+          </a:p>
+          <a:p>
+            <a:pPr marL="0" indent="0">
+              <a:buNone/>
+            </a:pPr>
+            <a:r>
+              <a:rPr lang="en-US" sz="1800" dirty="0"/>
+              <a:t>    }</a:t>
+            </a:r>
+            <a:endParaRPr lang="en-US" sz="1800" dirty="0"/>
+          </a:p>
+        </p:txBody>
+      </p:sp>
+      <p:sp>
+        <p:nvSpPr>
+          <p:cNvPr id="4" name="TextBox 3"/>
+          <p:cNvSpPr txBox="1"/>
+          <p:nvPr/>
+        </p:nvSpPr>
+        <p:spPr>
+          <a:xfrm>
+            <a:off x="7513426" y="1614609"/>
+            <a:ext cx="3486275" cy="4247317"/>
+          </a:xfrm>
+          <a:prstGeom prst="rect">
+            <a:avLst/>
+          </a:prstGeom>
+          <a:noFill/>
+        </p:spPr>
+        <p:txBody>
+          <a:bodyPr wrap="none" rtlCol="0">
+            <a:spAutoFit/>
+          </a:bodyPr>
+          <a:lstStyle/>
+          <a:p>
+            <a:r>
+              <a:rPr lang="en-US" dirty="0"/>
+              <a:t> [</a:t>
+            </a:r>
+            <a:r>
+              <a:rPr lang="en-US" dirty="0" err="1"/>
+              <a:t>DataContract</a:t>
+            </a:r>
+            <a:r>
+              <a:rPr lang="en-US" dirty="0"/>
+              <a:t>]</a:t>
+            </a:r>
+          </a:p>
+          <a:p>
+            <a:r>
+              <a:rPr lang="en-US" dirty="0"/>
+              <a:t>    public class </a:t>
+            </a:r>
+            <a:r>
+              <a:rPr lang="en-US" dirty="0" err="1"/>
+              <a:t>PlayerGameData</a:t>
+            </a:r>
+            <a:endParaRPr lang="en-US" dirty="0"/>
+          </a:p>
+          <a:p>
+            <a:r>
+              <a:rPr lang="en-US" dirty="0"/>
+              <a:t>    {</a:t>
+            </a:r>
+          </a:p>
+          <a:p>
+            <a:r>
+              <a:rPr lang="en-US" dirty="0"/>
+              <a:t>        [</a:t>
+            </a:r>
+            <a:r>
+              <a:rPr lang="en-US" dirty="0" err="1"/>
+              <a:t>DataMember</a:t>
+            </a:r>
+            <a:r>
+              <a:rPr lang="en-US" dirty="0"/>
+              <a:t>]</a:t>
+            </a:r>
+          </a:p>
+          <a:p>
+            <a:r>
+              <a:rPr lang="en-US" dirty="0"/>
+              <a:t>        public </a:t>
+            </a:r>
+            <a:r>
+              <a:rPr lang="en-US" dirty="0" err="1"/>
+              <a:t>bool</a:t>
+            </a:r>
+            <a:r>
+              <a:rPr lang="en-US" dirty="0"/>
+              <a:t> Win { get; set; }</a:t>
+            </a:r>
+          </a:p>
+          <a:p>
+            <a:endParaRPr lang="en-US" dirty="0"/>
+          </a:p>
+          <a:p>
+            <a:r>
+              <a:rPr lang="en-US" dirty="0"/>
+              <a:t>        [</a:t>
+            </a:r>
+            <a:r>
+              <a:rPr lang="en-US" dirty="0" err="1"/>
+              <a:t>DataMember</a:t>
+            </a:r>
+            <a:r>
+              <a:rPr lang="en-US" dirty="0"/>
+              <a:t>]</a:t>
+            </a:r>
+          </a:p>
+          <a:p>
+            <a:r>
+              <a:rPr lang="en-US" dirty="0"/>
+              <a:t>        public Int32 Points { get; set; }</a:t>
+            </a:r>
+          </a:p>
+          <a:p>
+            <a:endParaRPr lang="en-US" dirty="0"/>
+          </a:p>
+          <a:p>
+            <a:r>
+              <a:rPr lang="en-US" dirty="0"/>
+              <a:t>        [</a:t>
+            </a:r>
+            <a:r>
+              <a:rPr lang="en-US" dirty="0" err="1"/>
+              <a:t>DataMember</a:t>
+            </a:r>
+            <a:r>
+              <a:rPr lang="en-US" dirty="0"/>
+              <a:t>]</a:t>
+            </a:r>
+          </a:p>
+          <a:p>
+            <a:r>
+              <a:rPr lang="en-US" dirty="0"/>
+              <a:t>        public Int32 Kills { get; set; }</a:t>
+            </a:r>
+          </a:p>
+          <a:p>
+            <a:endParaRPr lang="en-US" dirty="0"/>
+          </a:p>
+          <a:p>
+            <a:r>
+              <a:rPr lang="en-US" dirty="0"/>
+              <a:t>        [</a:t>
+            </a:r>
+            <a:r>
+              <a:rPr lang="en-US" dirty="0" err="1"/>
+              <a:t>DataMember</a:t>
+            </a:r>
+            <a:r>
+              <a:rPr lang="en-US" dirty="0"/>
+              <a:t>]</a:t>
+            </a:r>
+          </a:p>
+          <a:p>
+            <a:r>
+              <a:rPr lang="en-US" dirty="0"/>
+              <a:t>        public Int32 Deaths { get; set; }</a:t>
+            </a:r>
+          </a:p>
+          <a:p>
+            <a:r>
+              <a:rPr lang="en-US" dirty="0"/>
+              <a:t>    }</a:t>
+            </a:r>
+            <a:endParaRPr lang="en-US" dirty="0"/>
+          </a:p>
+        </p:txBody>
+      </p:sp>
+    </p:spTree>
+    <p:extLst>
+      <p:ext uri="{BB962C8B-B14F-4D97-AF65-F5344CB8AC3E}">
+        <p14:creationId xmlns:p14="http://schemas.microsoft.com/office/powerpoint/2010/main" val="279159175"/>
+      </p:ext>
+    </p:extLst>
+  </p:cSld>
+  <p:clrMapOvr>
+    <a:masterClrMapping/>
+  </p:clrMapOvr>
+</p:sld>
+</file>
+
+<file path=ppt/slides/slide14.xml><?xml version="1.0" encoding="utf-8"?>
+<p:sld xmlns:a="http://schemas.openxmlformats.org/drawingml/2006/main" xmlns:r="http://schemas.openxmlformats.org/officeDocument/2006/relationships" xmlns:p="http://schemas.openxmlformats.org/presentationml/2006/main">
+  <p:cSld>
+    <p:spTree>
+      <p:nvGrpSpPr>
+        <p:cNvPr id="1" name=""/>
+        <p:cNvGrpSpPr/>
+        <p:nvPr/>
+      </p:nvGrpSpPr>
+      <p:grpSpPr>
+        <a:xfrm>
+          <a:off x="0" y="0"/>
+          <a:ext cx="0" cy="0"/>
+          <a:chOff x="0" y="0"/>
+          <a:chExt cx="0" cy="0"/>
+        </a:xfrm>
+      </p:grpSpPr>
+      <p:sp>
+        <p:nvSpPr>
+          <p:cNvPr id="2" name="Title 1"/>
+          <p:cNvSpPr>
+            <a:spLocks noGrp="1"/>
+          </p:cNvSpPr>
+          <p:nvPr>
+            <p:ph type="title"/>
+          </p:nvPr>
+        </p:nvSpPr>
+        <p:spPr/>
+        <p:txBody>
+          <a:bodyPr/>
+          <a:lstStyle/>
+          <a:p>
+            <a:r>
+              <a:rPr lang="en-US" dirty="0" smtClean="0"/>
+              <a:t>Simple Stats Example</a:t>
+            </a:r>
+            <a:endParaRPr lang="en-US" dirty="0"/>
+          </a:p>
+        </p:txBody>
+      </p:sp>
+      <p:sp>
+        <p:nvSpPr>
+          <p:cNvPr id="3" name="Content Placeholder 2"/>
+          <p:cNvSpPr>
+            <a:spLocks noGrp="1"/>
+          </p:cNvSpPr>
+          <p:nvPr>
+            <p:ph idx="1"/>
+          </p:nvPr>
+        </p:nvSpPr>
+        <p:spPr>
+          <a:xfrm>
+            <a:off x="838200" y="3468988"/>
+            <a:ext cx="5863137" cy="2855080"/>
+          </a:xfrm>
+        </p:spPr>
+        <p:txBody>
+          <a:bodyPr>
+            <a:normAutofit fontScale="85000" lnSpcReduction="20000"/>
+          </a:bodyPr>
+          <a:lstStyle/>
+          <a:p>
+            <a:pPr marL="0" indent="0">
+              <a:buNone/>
+            </a:pPr>
+            <a:r>
+              <a:rPr lang="en-US" dirty="0"/>
+              <a:t>CREATE </a:t>
+            </a:r>
+            <a:r>
+              <a:rPr lang="en-US" dirty="0" smtClean="0"/>
+              <a:t>TABLE [</a:t>
+            </a:r>
+            <a:r>
+              <a:rPr lang="en-US" dirty="0" err="1" smtClean="0"/>
+              <a:t>simple_stats</a:t>
+            </a:r>
+            <a:r>
+              <a:rPr lang="en-US" dirty="0"/>
+              <a:t>].[</a:t>
+            </a:r>
+            <a:r>
+              <a:rPr lang="en-US" dirty="0" err="1"/>
+              <a:t>dbo</a:t>
+            </a:r>
+            <a:r>
+              <a:rPr lang="en-US" dirty="0"/>
+              <a:t>].[</a:t>
+            </a:r>
+            <a:r>
+              <a:rPr lang="en-US" dirty="0" err="1"/>
+              <a:t>PlayerTable</a:t>
+            </a:r>
+            <a:r>
+              <a:rPr lang="en-US" dirty="0" smtClean="0"/>
+              <a:t>]</a:t>
+            </a:r>
+          </a:p>
+          <a:p>
+            <a:pPr marL="0" indent="0">
+              <a:buNone/>
+            </a:pPr>
+            <a:r>
+              <a:rPr lang="en-US" dirty="0" smtClean="0"/>
+              <a:t>(</a:t>
+            </a:r>
+            <a:endParaRPr lang="en-US" dirty="0"/>
+          </a:p>
+          <a:p>
+            <a:pPr marL="457200" lvl="1" indent="0">
+              <a:buNone/>
+            </a:pPr>
+            <a:r>
+              <a:rPr lang="en-US" dirty="0"/>
+              <a:t>[</a:t>
+            </a:r>
+            <a:r>
+              <a:rPr lang="en-US" dirty="0" err="1"/>
+              <a:t>player_id</a:t>
+            </a:r>
+            <a:r>
+              <a:rPr lang="en-US" dirty="0"/>
+              <a:t>] [</a:t>
+            </a:r>
+            <a:r>
+              <a:rPr lang="en-US" dirty="0" err="1"/>
+              <a:t>bigint</a:t>
+            </a:r>
+            <a:r>
+              <a:rPr lang="en-US" dirty="0"/>
+              <a:t>] NOT NULL,</a:t>
+            </a:r>
+          </a:p>
+          <a:p>
+            <a:pPr marL="457200" lvl="1" indent="0">
+              <a:buNone/>
+            </a:pPr>
+            <a:r>
+              <a:rPr lang="en-US" dirty="0"/>
+              <a:t>[</a:t>
+            </a:r>
+            <a:r>
+              <a:rPr lang="en-US" dirty="0" err="1"/>
+              <a:t>player_name</a:t>
+            </a:r>
+            <a:r>
+              <a:rPr lang="en-US" dirty="0"/>
+              <a:t>] [</a:t>
+            </a:r>
+            <a:r>
+              <a:rPr lang="en-US" dirty="0" err="1"/>
+              <a:t>varchar</a:t>
+            </a:r>
+            <a:r>
+              <a:rPr lang="en-US" dirty="0"/>
+              <a:t>](50) NOT NULL,</a:t>
+            </a:r>
+          </a:p>
+          <a:p>
+            <a:pPr marL="457200" lvl="1" indent="0">
+              <a:buNone/>
+            </a:pPr>
+            <a:r>
+              <a:rPr lang="en-US" dirty="0"/>
+              <a:t>[</a:t>
+            </a:r>
+            <a:r>
+              <a:rPr lang="en-US" dirty="0" err="1"/>
+              <a:t>player_pic</a:t>
+            </a:r>
+            <a:r>
+              <a:rPr lang="en-US" dirty="0"/>
+              <a:t>] [image] </a:t>
+            </a:r>
+            <a:r>
+              <a:rPr lang="en-US" dirty="0" smtClean="0"/>
+              <a:t>NULL</a:t>
+            </a:r>
+            <a:endParaRPr lang="en-US" dirty="0"/>
+          </a:p>
+          <a:p>
+            <a:pPr marL="0" indent="0">
+              <a:buNone/>
+            </a:pPr>
+            <a:r>
+              <a:rPr lang="en-US" dirty="0"/>
+              <a:t> </a:t>
+            </a:r>
+            <a:r>
+              <a:rPr lang="en-US" dirty="0" smtClean="0"/>
+              <a:t>       PRIMARY </a:t>
+            </a:r>
+            <a:r>
+              <a:rPr lang="en-US" dirty="0"/>
+              <a:t>KEY (</a:t>
+            </a:r>
+            <a:r>
+              <a:rPr lang="en-US" dirty="0" err="1"/>
+              <a:t>player_id</a:t>
+            </a:r>
+            <a:r>
+              <a:rPr lang="en-US" dirty="0" smtClean="0"/>
+              <a:t>)</a:t>
+            </a:r>
+          </a:p>
+          <a:p>
+            <a:pPr marL="0" indent="0">
+              <a:buNone/>
+            </a:pPr>
+            <a:r>
+              <a:rPr lang="en-US" dirty="0" smtClean="0"/>
+              <a:t>)</a:t>
+            </a:r>
+          </a:p>
+          <a:p>
+            <a:pPr marL="0" indent="0">
+              <a:buNone/>
+            </a:pPr>
+            <a:endParaRPr lang="en-US" dirty="0"/>
+          </a:p>
+        </p:txBody>
+      </p:sp>
+    </p:spTree>
+    <p:extLst>
+      <p:ext uri="{BB962C8B-B14F-4D97-AF65-F5344CB8AC3E}">
+        <p14:creationId xmlns:p14="http://schemas.microsoft.com/office/powerpoint/2010/main" val="726395745"/>
+      </p:ext>
+    </p:extLst>
+  </p:cSld>
+  <p:clrMapOvr>
+    <a:masterClrMapping/>
+  </p:clrMapOvr>
+</p:sld>
+</file>
+
+<file path=ppt/slides/slide15.xml><?xml version="1.0" encoding="utf-8"?>
+<p:sld xmlns:a="http://schemas.openxmlformats.org/drawingml/2006/main" xmlns:r="http://schemas.openxmlformats.org/officeDocument/2006/relationships" xmlns:p="http://schemas.openxmlformats.org/presentationml/2006/main">
+  <p:cSld>
+    <p:spTree>
+      <p:nvGrpSpPr>
+        <p:cNvPr id="1" name=""/>
+        <p:cNvGrpSpPr/>
+        <p:nvPr/>
+      </p:nvGrpSpPr>
+      <p:grpSpPr>
+        <a:xfrm>
+          <a:off x="0" y="0"/>
+          <a:ext cx="0" cy="0"/>
+          <a:chOff x="0" y="0"/>
+          <a:chExt cx="0" cy="0"/>
+        </a:xfrm>
+      </p:grpSpPr>
+      <p:sp>
+        <p:nvSpPr>
+          <p:cNvPr id="2" name="Title 1"/>
+          <p:cNvSpPr>
+            <a:spLocks noGrp="1"/>
+          </p:cNvSpPr>
+          <p:nvPr>
+            <p:ph type="title"/>
+          </p:nvPr>
+        </p:nvSpPr>
+        <p:spPr/>
+        <p:txBody>
+          <a:bodyPr/>
+          <a:lstStyle/>
+          <a:p>
+            <a:r>
+              <a:rPr lang="en-US" dirty="0" smtClean="0"/>
+              <a:t>Moving to Azure Storage</a:t>
+            </a:r>
+            <a:endParaRPr lang="en-US" dirty="0"/>
+          </a:p>
+        </p:txBody>
+      </p:sp>
+      <p:sp>
+        <p:nvSpPr>
+          <p:cNvPr id="3" name="Content Placeholder 2"/>
+          <p:cNvSpPr>
+            <a:spLocks noGrp="1"/>
+          </p:cNvSpPr>
+          <p:nvPr>
+            <p:ph idx="1"/>
+          </p:nvPr>
+        </p:nvSpPr>
+        <p:spPr/>
+        <p:txBody>
+          <a:bodyPr/>
+          <a:lstStyle/>
+          <a:p>
+            <a:r>
+              <a:rPr lang="en-US" dirty="0" smtClean="0"/>
+              <a:t>Choose a Partition Key</a:t>
+            </a:r>
+          </a:p>
+          <a:p>
+            <a:pPr lvl="1"/>
+            <a:r>
+              <a:rPr lang="en-US" dirty="0" smtClean="0"/>
+              <a:t>Games or Player</a:t>
+            </a:r>
+          </a:p>
+          <a:p>
+            <a:r>
+              <a:rPr lang="en-US" dirty="0" smtClean="0"/>
+              <a:t>What Transactions do we want</a:t>
+            </a:r>
+          </a:p>
+          <a:p>
+            <a:pPr lvl="1"/>
+            <a:r>
+              <a:rPr lang="en-US" dirty="0" smtClean="0"/>
+              <a:t>On game end, update player totals &amp; ensure game data is written</a:t>
+            </a:r>
+          </a:p>
+          <a:p>
+            <a:r>
+              <a:rPr lang="en-US" dirty="0" smtClean="0"/>
+              <a:t>Queries </a:t>
+            </a:r>
+          </a:p>
+          <a:p>
+            <a:pPr lvl="1"/>
+            <a:r>
+              <a:rPr lang="en-US" dirty="0" smtClean="0"/>
+              <a:t>Show Player Statistics</a:t>
+            </a:r>
+          </a:p>
+          <a:p>
+            <a:pPr lvl="1"/>
+            <a:r>
+              <a:rPr lang="en-US" dirty="0" smtClean="0"/>
+              <a:t>Show me all the games I’ve played</a:t>
+            </a:r>
+          </a:p>
+          <a:p>
+            <a:pPr lvl="1"/>
+            <a:r>
+              <a:rPr lang="en-US" dirty="0" smtClean="0"/>
+              <a:t>Show me statistics for a single game.   </a:t>
+            </a:r>
+          </a:p>
+        </p:txBody>
+      </p:sp>
+    </p:spTree>
+    <p:extLst>
+      <p:ext uri="{BB962C8B-B14F-4D97-AF65-F5344CB8AC3E}">
+        <p14:creationId xmlns:p14="http://schemas.microsoft.com/office/powerpoint/2010/main" val="1203378000"/>
+      </p:ext>
+    </p:extLst>
+  </p:cSld>
+  <p:clrMapOvr>
+    <a:masterClrMapping/>
+  </p:clrMapOvr>
+</p:sld>
+</file>
+
+<file path=ppt/slides/slide16.xml><?xml version="1.0" encoding="utf-8"?>
+<p:sld xmlns:a="http://schemas.openxmlformats.org/drawingml/2006/main" xmlns:r="http://schemas.openxmlformats.org/officeDocument/2006/relationships" xmlns:p="http://schemas.openxmlformats.org/presentationml/2006/main">
+  <p:cSld>
+    <p:spTree>
+      <p:nvGrpSpPr>
+        <p:cNvPr id="1" name=""/>
+        <p:cNvGrpSpPr/>
+        <p:nvPr/>
+      </p:nvGrpSpPr>
+      <p:grpSpPr>
+        <a:xfrm>
+          <a:off x="0" y="0"/>
+          <a:ext cx="0" cy="0"/>
+          <a:chOff x="0" y="0"/>
+          <a:chExt cx="0" cy="0"/>
+        </a:xfrm>
+      </p:grpSpPr>
+      <p:sp>
+        <p:nvSpPr>
+          <p:cNvPr id="2" name="Title 1"/>
+          <p:cNvSpPr>
+            <a:spLocks noGrp="1"/>
+          </p:cNvSpPr>
+          <p:nvPr>
+            <p:ph type="title"/>
+          </p:nvPr>
+        </p:nvSpPr>
+        <p:spPr/>
+        <p:txBody>
+          <a:bodyPr/>
+          <a:lstStyle/>
+          <a:p>
+            <a:r>
+              <a:rPr lang="en-US" dirty="0" smtClean="0"/>
+              <a:t>Choosing a Partition Key</a:t>
+            </a:r>
+            <a:endParaRPr lang="en-US" dirty="0"/>
+          </a:p>
+        </p:txBody>
+      </p:sp>
+      <p:sp>
+        <p:nvSpPr>
+          <p:cNvPr id="3" name="Content Placeholder 2"/>
+          <p:cNvSpPr>
+            <a:spLocks noGrp="1"/>
+          </p:cNvSpPr>
+          <p:nvPr>
+            <p:ph idx="1"/>
+          </p:nvPr>
+        </p:nvSpPr>
+        <p:spPr/>
+        <p:txBody>
+          <a:bodyPr/>
+          <a:lstStyle/>
+          <a:p>
+            <a:pPr marL="0" indent="0">
+              <a:buNone/>
+            </a:pPr>
+            <a:r>
+              <a:rPr lang="en-US" dirty="0" smtClean="0"/>
+              <a:t>Player Id as Partition Key</a:t>
+            </a:r>
+          </a:p>
+          <a:p>
+            <a:pPr lvl="1"/>
+            <a:r>
+              <a:rPr lang="en-US" dirty="0" smtClean="0"/>
+              <a:t>All player data will be in the same partition</a:t>
+            </a:r>
+          </a:p>
+          <a:p>
+            <a:pPr lvl="1"/>
+            <a:r>
+              <a:rPr lang="en-US" dirty="0" smtClean="0"/>
+              <a:t>Batch Reads &amp; Writes of Player data</a:t>
+            </a:r>
+          </a:p>
+          <a:p>
+            <a:pPr marL="0" indent="0">
+              <a:buNone/>
+            </a:pPr>
+            <a:r>
+              <a:rPr lang="en-US" dirty="0" smtClean="0"/>
+              <a:t>Player Id is random enough for node splitting </a:t>
+            </a:r>
+          </a:p>
+          <a:p>
+            <a:pPr marL="0" indent="0">
+              <a:buNone/>
+            </a:pPr>
+            <a:endParaRPr lang="en-US" dirty="0"/>
+          </a:p>
+          <a:p>
+            <a:pPr marL="0" indent="0">
+              <a:buNone/>
+            </a:pPr>
+            <a:r>
+              <a:rPr lang="en-US" dirty="0" smtClean="0"/>
+              <a:t>Table = “Players”</a:t>
+            </a:r>
+          </a:p>
+          <a:p>
+            <a:pPr marL="0" indent="0">
+              <a:buNone/>
+            </a:pPr>
+            <a:r>
+              <a:rPr lang="en-US" dirty="0" err="1" smtClean="0"/>
+              <a:t>PartitionKey</a:t>
+            </a:r>
+            <a:r>
+              <a:rPr lang="en-US" dirty="0" smtClean="0"/>
+              <a:t> = “</a:t>
+            </a:r>
+            <a:r>
+              <a:rPr lang="en-US" dirty="0" err="1" smtClean="0"/>
+              <a:t>PlayerId</a:t>
+            </a:r>
+            <a:r>
+              <a:rPr lang="en-US" dirty="0" smtClean="0"/>
+              <a:t>” </a:t>
+            </a:r>
+          </a:p>
+          <a:p>
+            <a:pPr marL="0" indent="0">
+              <a:buNone/>
+            </a:pPr>
+            <a:endParaRPr lang="en-US" dirty="0" smtClean="0"/>
+          </a:p>
+        </p:txBody>
+      </p:sp>
+    </p:spTree>
+    <p:extLst>
+      <p:ext uri="{BB962C8B-B14F-4D97-AF65-F5344CB8AC3E}">
+        <p14:creationId xmlns:p14="http://schemas.microsoft.com/office/powerpoint/2010/main" val="1755687874"/>
+      </p:ext>
+    </p:extLst>
+  </p:cSld>
+  <p:clrMapOvr>
+    <a:masterClrMapping/>
+  </p:clrMapOvr>
+</p:sld>
+</file>
+
+<file path=ppt/slides/slide17.xml><?xml version="1.0" encoding="utf-8"?>
+<p:sld xmlns:a="http://schemas.openxmlformats.org/drawingml/2006/main" xmlns:r="http://schemas.openxmlformats.org/officeDocument/2006/relationships" xmlns:p="http://schemas.openxmlformats.org/presentationml/2006/main">
+  <p:cSld>
+    <p:spTree>
+      <p:nvGrpSpPr>
+        <p:cNvPr id="1" name=""/>
+        <p:cNvGrpSpPr/>
+        <p:nvPr/>
+      </p:nvGrpSpPr>
+      <p:grpSpPr>
+        <a:xfrm>
+          <a:off x="0" y="0"/>
+          <a:ext cx="0" cy="0"/>
+          <a:chOff x="0" y="0"/>
+          <a:chExt cx="0" cy="0"/>
+        </a:xfrm>
+      </p:grpSpPr>
+      <p:sp>
+        <p:nvSpPr>
+          <p:cNvPr id="2" name="Title 1"/>
+          <p:cNvSpPr>
+            <a:spLocks noGrp="1"/>
+          </p:cNvSpPr>
+          <p:nvPr>
+            <p:ph type="title"/>
+          </p:nvPr>
+        </p:nvSpPr>
+        <p:spPr/>
+        <p:txBody>
+          <a:bodyPr/>
+          <a:lstStyle/>
+          <a:p>
+            <a:r>
+              <a:rPr lang="en-US" dirty="0" smtClean="0"/>
+              <a:t>Creating Table </a:t>
+            </a:r>
+            <a:endParaRPr lang="en-US" dirty="0"/>
+          </a:p>
+        </p:txBody>
+      </p:sp>
+      <p:sp>
+        <p:nvSpPr>
+          <p:cNvPr id="3" name="Content Placeholder 2"/>
+          <p:cNvSpPr>
+            <a:spLocks noGrp="1"/>
+          </p:cNvSpPr>
+          <p:nvPr>
+            <p:ph idx="1"/>
+          </p:nvPr>
+        </p:nvSpPr>
+        <p:spPr/>
+        <p:txBody>
+          <a:bodyPr>
+            <a:normAutofit/>
+          </a:bodyPr>
+          <a:lstStyle/>
+          <a:p>
+            <a:pPr marL="0" indent="0">
+              <a:buNone/>
+            </a:pPr>
+            <a:r>
+              <a:rPr lang="en-US" dirty="0"/>
+              <a:t> // Retrieve the storage account from the connection string.</a:t>
+            </a:r>
+          </a:p>
+          <a:p>
+            <a:pPr marL="0" indent="0">
+              <a:buNone/>
+            </a:pPr>
+            <a:r>
+              <a:rPr lang="en-US" dirty="0"/>
+              <a:t> </a:t>
+            </a:r>
+            <a:r>
+              <a:rPr lang="en-US" dirty="0" err="1" smtClean="0"/>
+              <a:t>StorageAccount</a:t>
+            </a:r>
+            <a:r>
+              <a:rPr lang="en-US" dirty="0" smtClean="0"/>
+              <a:t> </a:t>
+            </a:r>
+            <a:r>
+              <a:rPr lang="en-US" dirty="0"/>
+              <a:t>= </a:t>
+            </a:r>
+            <a:r>
+              <a:rPr lang="en-US" dirty="0" err="1"/>
+              <a:t>CloudStorageAccount.Parse</a:t>
+            </a:r>
+            <a:r>
+              <a:rPr lang="en-US" dirty="0"/>
+              <a:t>(</a:t>
+            </a:r>
+            <a:r>
+              <a:rPr lang="en-US" dirty="0" err="1"/>
+              <a:t>StorageAccountString</a:t>
+            </a:r>
+            <a:r>
+              <a:rPr lang="en-US" dirty="0"/>
+              <a:t>);</a:t>
+            </a:r>
+          </a:p>
+          <a:p>
+            <a:pPr marL="0" indent="0">
+              <a:buNone/>
+            </a:pPr>
+            <a:endParaRPr lang="en-US" dirty="0"/>
+          </a:p>
+          <a:p>
+            <a:pPr marL="0" indent="0">
+              <a:buNone/>
+            </a:pPr>
+            <a:r>
+              <a:rPr lang="en-US" dirty="0" smtClean="0"/>
+              <a:t>// </a:t>
+            </a:r>
+            <a:r>
+              <a:rPr lang="en-US" dirty="0"/>
+              <a:t>Create the table client.</a:t>
+            </a:r>
+          </a:p>
+          <a:p>
+            <a:pPr marL="0" indent="0">
+              <a:buNone/>
+            </a:pPr>
+            <a:r>
+              <a:rPr lang="en-US" dirty="0" err="1" smtClean="0"/>
+              <a:t>TableClient</a:t>
+            </a:r>
+            <a:r>
+              <a:rPr lang="en-US" dirty="0" smtClean="0"/>
+              <a:t> </a:t>
+            </a:r>
+            <a:r>
+              <a:rPr lang="en-US" dirty="0"/>
+              <a:t>= </a:t>
+            </a:r>
+            <a:r>
+              <a:rPr lang="en-US" dirty="0" err="1"/>
+              <a:t>StorageAccount.CreateCloudTableClient</a:t>
+            </a:r>
+            <a:r>
+              <a:rPr lang="en-US" dirty="0"/>
+              <a:t>();</a:t>
+            </a:r>
+          </a:p>
+          <a:p>
+            <a:pPr marL="0" indent="0">
+              <a:buNone/>
+            </a:pPr>
+            <a:endParaRPr lang="en-US" dirty="0"/>
+          </a:p>
+          <a:p>
+            <a:pPr marL="0" indent="0">
+              <a:buNone/>
+            </a:pPr>
+            <a:r>
+              <a:rPr lang="en-US" dirty="0" smtClean="0"/>
+              <a:t>// </a:t>
+            </a:r>
+            <a:r>
+              <a:rPr lang="en-US" dirty="0"/>
+              <a:t>Create the table if it doesn't exist.</a:t>
+            </a:r>
+          </a:p>
+          <a:p>
+            <a:pPr marL="0" indent="0">
+              <a:buNone/>
+            </a:pPr>
+            <a:r>
+              <a:rPr lang="en-US" dirty="0" err="1" smtClean="0"/>
+              <a:t>PlayersTable</a:t>
+            </a:r>
+            <a:r>
+              <a:rPr lang="en-US" dirty="0" smtClean="0"/>
+              <a:t> </a:t>
+            </a:r>
+            <a:r>
+              <a:rPr lang="en-US" dirty="0"/>
+              <a:t>= </a:t>
+            </a:r>
+            <a:r>
+              <a:rPr lang="en-US" dirty="0" err="1"/>
+              <a:t>TableClient.GetTableReference</a:t>
+            </a:r>
+            <a:r>
+              <a:rPr lang="en-US" dirty="0"/>
+              <a:t>("Players");</a:t>
+            </a:r>
+            <a:endParaRPr lang="en-US" dirty="0"/>
+          </a:p>
+        </p:txBody>
+      </p:sp>
+    </p:spTree>
+    <p:extLst>
+      <p:ext uri="{BB962C8B-B14F-4D97-AF65-F5344CB8AC3E}">
+        <p14:creationId xmlns:p14="http://schemas.microsoft.com/office/powerpoint/2010/main" val="2704933261"/>
+      </p:ext>
+    </p:extLst>
+  </p:cSld>
+  <p:clrMapOvr>
+    <a:masterClrMapping/>
+  </p:clrMapOvr>
+</p:sld>
+</file>
+
+<file path=ppt/slides/slide18.xml><?xml version="1.0" encoding="utf-8"?>
+<p:sld xmlns:a="http://schemas.openxmlformats.org/drawingml/2006/main" xmlns:r="http://schemas.openxmlformats.org/officeDocument/2006/relationships" xmlns:p="http://schemas.openxmlformats.org/presentationml/2006/main">
+  <p:cSld>
+    <p:spTree>
+      <p:nvGrpSpPr>
+        <p:cNvPr id="1" name=""/>
+        <p:cNvGrpSpPr/>
+        <p:nvPr/>
+      </p:nvGrpSpPr>
+      <p:grpSpPr>
+        <a:xfrm>
+          <a:off x="0" y="0"/>
+          <a:ext cx="0" cy="0"/>
+          <a:chOff x="0" y="0"/>
+          <a:chExt cx="0" cy="0"/>
+        </a:xfrm>
+      </p:grpSpPr>
+      <p:sp>
+        <p:nvSpPr>
+          <p:cNvPr id="2" name="Title 1"/>
+          <p:cNvSpPr>
+            <a:spLocks noGrp="1"/>
+          </p:cNvSpPr>
+          <p:nvPr>
+            <p:ph type="title"/>
+          </p:nvPr>
+        </p:nvSpPr>
+        <p:spPr/>
+        <p:txBody>
+          <a:bodyPr/>
+          <a:lstStyle/>
+          <a:p>
+            <a:r>
+              <a:rPr lang="en-US" dirty="0" smtClean="0"/>
+              <a:t>Entities</a:t>
+            </a:r>
+            <a:endParaRPr lang="en-US" dirty="0"/>
+          </a:p>
+        </p:txBody>
+      </p:sp>
+      <p:sp>
+        <p:nvSpPr>
+          <p:cNvPr id="3" name="Content Placeholder 2"/>
+          <p:cNvSpPr>
+            <a:spLocks noGrp="1"/>
+          </p:cNvSpPr>
+          <p:nvPr>
+            <p:ph idx="1"/>
+          </p:nvPr>
+        </p:nvSpPr>
+        <p:spPr/>
+        <p:txBody>
+          <a:bodyPr/>
+          <a:lstStyle/>
+          <a:p>
+            <a:r>
+              <a:rPr lang="en-US" dirty="0" smtClean="0"/>
+              <a:t>We need Entities to Store Player Data (player specific &amp; stats totals)</a:t>
+            </a:r>
+          </a:p>
+          <a:p>
+            <a:r>
+              <a:rPr lang="en-US" dirty="0" smtClean="0"/>
+              <a:t>We need Entities to Store Game Statistics </a:t>
+            </a:r>
+          </a:p>
+          <a:p>
+            <a:endParaRPr lang="en-US" dirty="0"/>
+          </a:p>
+          <a:p>
+            <a:endParaRPr lang="en-US" dirty="0"/>
+          </a:p>
+        </p:txBody>
+      </p:sp>
+    </p:spTree>
+    <p:extLst>
+      <p:ext uri="{BB962C8B-B14F-4D97-AF65-F5344CB8AC3E}">
+        <p14:creationId xmlns:p14="http://schemas.microsoft.com/office/powerpoint/2010/main" val="2695636226"/>
+      </p:ext>
+    </p:extLst>
+  </p:cSld>
+  <p:clrMapOvr>
+    <a:masterClrMapping/>
+  </p:clrMapOvr>
+</p:sld>
+</file>
+
+<file path=ppt/slides/slide19.xml><?xml version="1.0" encoding="utf-8"?>
+<p:sld xmlns:a="http://schemas.openxmlformats.org/drawingml/2006/main" xmlns:r="http://schemas.openxmlformats.org/officeDocument/2006/relationships" xmlns:p="http://schemas.openxmlformats.org/presentationml/2006/main">
+  <p:cSld>
+    <p:spTree>
+      <p:nvGrpSpPr>
+        <p:cNvPr id="1" name=""/>
+        <p:cNvGrpSpPr/>
+        <p:nvPr/>
+      </p:nvGrpSpPr>
+      <p:grpSpPr>
+        <a:xfrm>
+          <a:off x="0" y="0"/>
+          <a:ext cx="0" cy="0"/>
+          <a:chOff x="0" y="0"/>
+          <a:chExt cx="0" cy="0"/>
+        </a:xfrm>
+      </p:grpSpPr>
+      <p:sp>
+        <p:nvSpPr>
+          <p:cNvPr id="2" name="Title 1"/>
+          <p:cNvSpPr>
+            <a:spLocks noGrp="1"/>
+          </p:cNvSpPr>
+          <p:nvPr>
+            <p:ph type="title"/>
+          </p:nvPr>
+        </p:nvSpPr>
+        <p:spPr/>
+        <p:txBody>
+          <a:bodyPr/>
+          <a:lstStyle/>
+          <a:p>
+            <a:r>
+              <a:rPr lang="en-US" dirty="0" smtClean="0"/>
+              <a:t>Player Entity</a:t>
+            </a:r>
+            <a:endParaRPr lang="en-US" dirty="0"/>
+          </a:p>
+        </p:txBody>
+      </p:sp>
+      <p:sp>
+        <p:nvSpPr>
+          <p:cNvPr id="3" name="Content Placeholder 2"/>
+          <p:cNvSpPr>
+            <a:spLocks noGrp="1"/>
+          </p:cNvSpPr>
+          <p:nvPr>
+            <p:ph idx="1"/>
+          </p:nvPr>
+        </p:nvSpPr>
+        <p:spPr>
+          <a:xfrm>
+            <a:off x="838200" y="1387586"/>
+            <a:ext cx="5262063" cy="4789377"/>
+          </a:xfrm>
+        </p:spPr>
+        <p:txBody>
+          <a:bodyPr>
+            <a:noAutofit/>
+          </a:bodyPr>
+          <a:lstStyle/>
+          <a:p>
+            <a:pPr marL="0" indent="0">
+              <a:buNone/>
+            </a:pPr>
+            <a:r>
+              <a:rPr lang="en-US" sz="2000" dirty="0"/>
+              <a:t> public class </a:t>
+            </a:r>
+            <a:r>
+              <a:rPr lang="en-US" sz="2000" dirty="0" err="1"/>
+              <a:t>PlayerEntity</a:t>
+            </a:r>
+            <a:r>
+              <a:rPr lang="en-US" sz="2000" dirty="0"/>
+              <a:t> : </a:t>
+            </a:r>
+            <a:r>
+              <a:rPr lang="en-US" sz="2000" dirty="0" err="1"/>
+              <a:t>TableEntity</a:t>
+            </a:r>
+            <a:endParaRPr lang="en-US" sz="2000" dirty="0"/>
+          </a:p>
+          <a:p>
+            <a:pPr marL="0" indent="0">
+              <a:buNone/>
+            </a:pPr>
+            <a:r>
+              <a:rPr lang="en-US" sz="2000" dirty="0"/>
+              <a:t>    </a:t>
+            </a:r>
+            <a:r>
+              <a:rPr lang="en-US" sz="2000" dirty="0" smtClean="0"/>
+              <a:t>{</a:t>
+            </a:r>
+            <a:endParaRPr lang="en-US" sz="2000" dirty="0"/>
+          </a:p>
+          <a:p>
+            <a:pPr marL="0" indent="0">
+              <a:buNone/>
+            </a:pPr>
+            <a:r>
+              <a:rPr lang="en-US" sz="2000" dirty="0"/>
+              <a:t>        public string Name { get; set; }</a:t>
+            </a:r>
+          </a:p>
+          <a:p>
+            <a:pPr marL="0" indent="0">
+              <a:buNone/>
+            </a:pPr>
+            <a:r>
+              <a:rPr lang="en-US" sz="2000" dirty="0"/>
+              <a:t>        public string Picture { get; set; }</a:t>
+            </a:r>
+          </a:p>
+          <a:p>
+            <a:pPr marL="0" indent="0">
+              <a:buNone/>
+            </a:pPr>
+            <a:endParaRPr lang="en-US" sz="2000" dirty="0"/>
+          </a:p>
+          <a:p>
+            <a:pPr marL="0" indent="0">
+              <a:buNone/>
+            </a:pPr>
+            <a:r>
+              <a:rPr lang="en-US" sz="2000" dirty="0"/>
+              <a:t>        public Int64 </a:t>
+            </a:r>
+            <a:r>
+              <a:rPr lang="en-US" sz="2000" dirty="0" err="1"/>
+              <a:t>TotalPoints</a:t>
+            </a:r>
+            <a:r>
+              <a:rPr lang="en-US" sz="2000" dirty="0"/>
+              <a:t> { get; set; }</a:t>
+            </a:r>
+          </a:p>
+          <a:p>
+            <a:pPr marL="0" indent="0">
+              <a:buNone/>
+            </a:pPr>
+            <a:r>
+              <a:rPr lang="en-US" sz="2000" dirty="0"/>
+              <a:t>        public Int32 </a:t>
+            </a:r>
+            <a:r>
+              <a:rPr lang="en-US" sz="2000" dirty="0" err="1"/>
+              <a:t>TotalGames</a:t>
+            </a:r>
+            <a:r>
+              <a:rPr lang="en-US" sz="2000" dirty="0"/>
+              <a:t> { get; set; }</a:t>
+            </a:r>
+          </a:p>
+          <a:p>
+            <a:pPr marL="0" indent="0">
+              <a:buNone/>
+            </a:pPr>
+            <a:r>
+              <a:rPr lang="en-US" sz="2000" dirty="0"/>
+              <a:t>        public Int32 </a:t>
+            </a:r>
+            <a:r>
+              <a:rPr lang="en-US" sz="2000" dirty="0" err="1"/>
+              <a:t>TotalWins</a:t>
+            </a:r>
+            <a:r>
+              <a:rPr lang="en-US" sz="2000" dirty="0"/>
+              <a:t> { get; set; }</a:t>
+            </a:r>
+          </a:p>
+          <a:p>
+            <a:pPr marL="0" indent="0">
+              <a:buNone/>
+            </a:pPr>
+            <a:r>
+              <a:rPr lang="en-US" sz="2000" dirty="0"/>
+              <a:t>        public Int32 </a:t>
+            </a:r>
+            <a:r>
+              <a:rPr lang="en-US" sz="2000" dirty="0" err="1"/>
+              <a:t>TotalKills</a:t>
+            </a:r>
+            <a:r>
+              <a:rPr lang="en-US" sz="2000" dirty="0"/>
+              <a:t> { get; set; }</a:t>
+            </a:r>
+          </a:p>
+          <a:p>
+            <a:pPr marL="0" indent="0">
+              <a:buNone/>
+            </a:pPr>
+            <a:r>
+              <a:rPr lang="en-US" sz="2000" dirty="0"/>
+              <a:t>        public Int32 </a:t>
+            </a:r>
+            <a:r>
+              <a:rPr lang="en-US" sz="2000" dirty="0" err="1"/>
+              <a:t>TotalDeaths</a:t>
+            </a:r>
+            <a:r>
+              <a:rPr lang="en-US" sz="2000" dirty="0"/>
+              <a:t> { get; set; }</a:t>
+            </a:r>
+          </a:p>
+          <a:p>
+            <a:pPr marL="0" indent="0">
+              <a:buNone/>
+            </a:pPr>
+            <a:r>
+              <a:rPr lang="en-US" sz="2000" dirty="0"/>
+              <a:t>        public Int64 </a:t>
+            </a:r>
+            <a:r>
+              <a:rPr lang="en-US" sz="2000" dirty="0" err="1"/>
+              <a:t>TotalSecondsPlayed</a:t>
+            </a:r>
+            <a:r>
+              <a:rPr lang="en-US" sz="2000" dirty="0"/>
+              <a:t> { get; set; </a:t>
+            </a:r>
+            <a:r>
+              <a:rPr lang="en-US" sz="2000" dirty="0" smtClean="0"/>
+              <a:t>}</a:t>
+            </a:r>
+          </a:p>
+          <a:p>
+            <a:pPr marL="0" indent="0">
+              <a:buNone/>
+            </a:pPr>
+            <a:r>
+              <a:rPr lang="en-US" sz="2000" dirty="0"/>
+              <a:t>}</a:t>
+            </a:r>
+          </a:p>
+        </p:txBody>
+      </p:sp>
+      <p:sp>
+        <p:nvSpPr>
+          <p:cNvPr id="4" name="TextBox 3"/>
+          <p:cNvSpPr txBox="1"/>
+          <p:nvPr/>
+        </p:nvSpPr>
+        <p:spPr>
+          <a:xfrm>
+            <a:off x="6714126" y="1611390"/>
+            <a:ext cx="5000425" cy="923330"/>
+          </a:xfrm>
+          <a:prstGeom prst="rect">
+            <a:avLst/>
+          </a:prstGeom>
+          <a:noFill/>
+        </p:spPr>
+        <p:txBody>
+          <a:bodyPr wrap="square" rtlCol="0">
+            <a:spAutoFit/>
+          </a:bodyPr>
+          <a:lstStyle/>
+          <a:p>
+            <a:r>
+              <a:rPr lang="en-US" dirty="0" smtClean="0"/>
+              <a:t>Table = “Players”</a:t>
+            </a:r>
+          </a:p>
+          <a:p>
+            <a:r>
+              <a:rPr lang="en-US" dirty="0" err="1" smtClean="0"/>
+              <a:t>PartitionKey</a:t>
+            </a:r>
+            <a:r>
+              <a:rPr lang="en-US" dirty="0" smtClean="0"/>
+              <a:t> = {</a:t>
+            </a:r>
+            <a:r>
+              <a:rPr lang="en-US" dirty="0" err="1" smtClean="0"/>
+              <a:t>PlayerId</a:t>
+            </a:r>
+            <a:r>
+              <a:rPr lang="en-US" dirty="0" smtClean="0"/>
+              <a:t>}</a:t>
+            </a:r>
+          </a:p>
+          <a:p>
+            <a:r>
+              <a:rPr lang="en-US" dirty="0" err="1" smtClean="0"/>
+              <a:t>RowKey</a:t>
+            </a:r>
+            <a:r>
+              <a:rPr lang="en-US" dirty="0" smtClean="0"/>
+              <a:t> = “Players”</a:t>
+            </a:r>
+            <a:endParaRPr lang="en-US" dirty="0"/>
+          </a:p>
+        </p:txBody>
+      </p:sp>
+    </p:spTree>
+    <p:extLst>
+      <p:ext uri="{BB962C8B-B14F-4D97-AF65-F5344CB8AC3E}">
+        <p14:creationId xmlns:p14="http://schemas.microsoft.com/office/powerpoint/2010/main" val="612979330"/>
+      </p:ext>
+    </p:extLst>
+  </p:cSld>
+  <p:clrMapOvr>
+    <a:masterClrMapping/>
+  </p:clrMapOvr>
+</p:sld>
+</file>
+
 <file path=ppt/slides/slide2.xml><?xml version="1.0" encoding="utf-8"?>
 <p:sld xmlns:a="http://schemas.openxmlformats.org/drawingml/2006/main" xmlns:r="http://schemas.openxmlformats.org/officeDocument/2006/relationships" xmlns:p="http://schemas.openxmlformats.org/presentationml/2006/main">
   <p:cSld>
@@ -3170,6 +5347,1488 @@
     <p:extLst>
       <p:ext uri="{BB962C8B-B14F-4D97-AF65-F5344CB8AC3E}">
         <p14:creationId xmlns:p14="http://schemas.microsoft.com/office/powerpoint/2010/main" val="3905244092"/>
+      </p:ext>
+    </p:extLst>
+  </p:cSld>
+  <p:clrMapOvr>
+    <a:masterClrMapping/>
+  </p:clrMapOvr>
+</p:sld>
+</file>
+
+<file path=ppt/slides/slide20.xml><?xml version="1.0" encoding="utf-8"?>
+<p:sld xmlns:a="http://schemas.openxmlformats.org/drawingml/2006/main" xmlns:r="http://schemas.openxmlformats.org/officeDocument/2006/relationships" xmlns:p="http://schemas.openxmlformats.org/presentationml/2006/main">
+  <p:cSld>
+    <p:spTree>
+      <p:nvGrpSpPr>
+        <p:cNvPr id="1" name=""/>
+        <p:cNvGrpSpPr/>
+        <p:nvPr/>
+      </p:nvGrpSpPr>
+      <p:grpSpPr>
+        <a:xfrm>
+          <a:off x="0" y="0"/>
+          <a:ext cx="0" cy="0"/>
+          <a:chOff x="0" y="0"/>
+          <a:chExt cx="0" cy="0"/>
+        </a:xfrm>
+      </p:grpSpPr>
+      <p:sp>
+        <p:nvSpPr>
+          <p:cNvPr id="2" name="Title 1"/>
+          <p:cNvSpPr>
+            <a:spLocks noGrp="1"/>
+          </p:cNvSpPr>
+          <p:nvPr>
+            <p:ph type="title"/>
+          </p:nvPr>
+        </p:nvSpPr>
+        <p:spPr/>
+        <p:txBody>
+          <a:bodyPr/>
+          <a:lstStyle/>
+          <a:p>
+            <a:r>
+              <a:rPr lang="en-US" dirty="0" err="1" smtClean="0"/>
+              <a:t>PlayerGameEntity</a:t>
+            </a:r>
+            <a:endParaRPr lang="en-US" dirty="0"/>
+          </a:p>
+        </p:txBody>
+      </p:sp>
+      <p:sp>
+        <p:nvSpPr>
+          <p:cNvPr id="3" name="Content Placeholder 2"/>
+          <p:cNvSpPr>
+            <a:spLocks noGrp="1"/>
+          </p:cNvSpPr>
+          <p:nvPr>
+            <p:ph idx="1"/>
+          </p:nvPr>
+        </p:nvSpPr>
+        <p:spPr>
+          <a:xfrm>
+            <a:off x="838200" y="1918322"/>
+            <a:ext cx="4776088" cy="3632022"/>
+          </a:xfrm>
+        </p:spPr>
+        <p:txBody>
+          <a:bodyPr>
+            <a:normAutofit/>
+          </a:bodyPr>
+          <a:lstStyle/>
+          <a:p>
+            <a:pPr marL="0" indent="0">
+              <a:buNone/>
+            </a:pPr>
+            <a:r>
+              <a:rPr lang="en-US" sz="2000" dirty="0"/>
+              <a:t> public class </a:t>
+            </a:r>
+            <a:r>
+              <a:rPr lang="en-US" sz="2000" dirty="0" err="1"/>
+              <a:t>PlayerGameEntity</a:t>
+            </a:r>
+            <a:r>
+              <a:rPr lang="en-US" sz="2000" dirty="0"/>
+              <a:t> : </a:t>
+            </a:r>
+            <a:r>
+              <a:rPr lang="en-US" sz="2000" dirty="0" err="1"/>
+              <a:t>TableEntity</a:t>
+            </a:r>
+            <a:r>
+              <a:rPr lang="en-US" sz="2000" dirty="0"/>
+              <a:t> </a:t>
+            </a:r>
+          </a:p>
+          <a:p>
+            <a:pPr marL="0" indent="0">
+              <a:buNone/>
+            </a:pPr>
+            <a:r>
+              <a:rPr lang="en-US" sz="2000" dirty="0"/>
+              <a:t>    </a:t>
+            </a:r>
+            <a:r>
+              <a:rPr lang="en-US" sz="2000" dirty="0" smtClean="0"/>
+              <a:t>{</a:t>
+            </a:r>
+            <a:endParaRPr lang="en-US" sz="2000" dirty="0"/>
+          </a:p>
+          <a:p>
+            <a:pPr marL="0" indent="0">
+              <a:buNone/>
+            </a:pPr>
+            <a:r>
+              <a:rPr lang="en-US" sz="2000" dirty="0"/>
+              <a:t>        public Int64 Points { get; set; }</a:t>
+            </a:r>
+          </a:p>
+          <a:p>
+            <a:pPr marL="0" indent="0">
+              <a:buNone/>
+            </a:pPr>
+            <a:r>
+              <a:rPr lang="en-US" sz="2000" dirty="0"/>
+              <a:t>        public </a:t>
+            </a:r>
+            <a:r>
+              <a:rPr lang="en-US" sz="2000" dirty="0" err="1"/>
+              <a:t>bool</a:t>
+            </a:r>
+            <a:r>
+              <a:rPr lang="en-US" sz="2000" dirty="0"/>
+              <a:t> Win { get; set; }</a:t>
+            </a:r>
+          </a:p>
+          <a:p>
+            <a:pPr marL="0" indent="0">
+              <a:buNone/>
+            </a:pPr>
+            <a:r>
+              <a:rPr lang="en-US" sz="2000" dirty="0"/>
+              <a:t>        public Int32 Kills { get; set; }</a:t>
+            </a:r>
+          </a:p>
+          <a:p>
+            <a:pPr marL="0" indent="0">
+              <a:buNone/>
+            </a:pPr>
+            <a:r>
+              <a:rPr lang="en-US" sz="2000" dirty="0"/>
+              <a:t>        public Int32 Deaths { get; set; }</a:t>
+            </a:r>
+          </a:p>
+          <a:p>
+            <a:pPr marL="0" indent="0">
+              <a:buNone/>
+            </a:pPr>
+            <a:r>
+              <a:rPr lang="en-US" sz="2000" dirty="0"/>
+              <a:t>        public Int64 </a:t>
+            </a:r>
+            <a:r>
+              <a:rPr lang="en-US" sz="2000" dirty="0" err="1"/>
+              <a:t>GameDuration</a:t>
+            </a:r>
+            <a:r>
+              <a:rPr lang="en-US" sz="2000" dirty="0"/>
+              <a:t> { get; set; }  </a:t>
+            </a:r>
+          </a:p>
+          <a:p>
+            <a:pPr marL="0" indent="0">
+              <a:buNone/>
+            </a:pPr>
+            <a:r>
+              <a:rPr lang="en-US" sz="2000" dirty="0"/>
+              <a:t>    }</a:t>
+            </a:r>
+            <a:endParaRPr lang="en-US" sz="2000" dirty="0"/>
+          </a:p>
+        </p:txBody>
+      </p:sp>
+      <p:sp>
+        <p:nvSpPr>
+          <p:cNvPr id="4" name="TextBox 3"/>
+          <p:cNvSpPr txBox="1"/>
+          <p:nvPr/>
+        </p:nvSpPr>
+        <p:spPr>
+          <a:xfrm>
+            <a:off x="6835620" y="1918322"/>
+            <a:ext cx="5000425" cy="923330"/>
+          </a:xfrm>
+          <a:prstGeom prst="rect">
+            <a:avLst/>
+          </a:prstGeom>
+          <a:noFill/>
+        </p:spPr>
+        <p:txBody>
+          <a:bodyPr wrap="square" rtlCol="0">
+            <a:spAutoFit/>
+          </a:bodyPr>
+          <a:lstStyle/>
+          <a:p>
+            <a:r>
+              <a:rPr lang="en-US" dirty="0" smtClean="0"/>
+              <a:t>Table = “Players”</a:t>
+            </a:r>
+          </a:p>
+          <a:p>
+            <a:r>
+              <a:rPr lang="en-US" dirty="0" err="1" smtClean="0"/>
+              <a:t>PartitionKey</a:t>
+            </a:r>
+            <a:r>
+              <a:rPr lang="en-US" dirty="0" smtClean="0"/>
+              <a:t> = {</a:t>
+            </a:r>
+            <a:r>
+              <a:rPr lang="en-US" dirty="0" err="1" smtClean="0"/>
+              <a:t>PlayerId</a:t>
+            </a:r>
+            <a:r>
+              <a:rPr lang="en-US" dirty="0" smtClean="0"/>
+              <a:t>}</a:t>
+            </a:r>
+          </a:p>
+          <a:p>
+            <a:r>
+              <a:rPr lang="en-US" dirty="0" err="1" smtClean="0"/>
+              <a:t>RowKey</a:t>
+            </a:r>
+            <a:r>
+              <a:rPr lang="en-US" dirty="0" smtClean="0"/>
+              <a:t> = “Game_{</a:t>
+            </a:r>
+            <a:r>
+              <a:rPr lang="en-US" dirty="0" err="1" smtClean="0"/>
+              <a:t>GameID</a:t>
+            </a:r>
+            <a:r>
+              <a:rPr lang="en-US" dirty="0" smtClean="0"/>
+              <a:t>}”</a:t>
+            </a:r>
+            <a:endParaRPr lang="en-US" dirty="0"/>
+          </a:p>
+        </p:txBody>
+      </p:sp>
+    </p:spTree>
+    <p:extLst>
+      <p:ext uri="{BB962C8B-B14F-4D97-AF65-F5344CB8AC3E}">
+        <p14:creationId xmlns:p14="http://schemas.microsoft.com/office/powerpoint/2010/main" val="1913123010"/>
+      </p:ext>
+    </p:extLst>
+  </p:cSld>
+  <p:clrMapOvr>
+    <a:masterClrMapping/>
+  </p:clrMapOvr>
+</p:sld>
+</file>
+
+<file path=ppt/slides/slide21.xml><?xml version="1.0" encoding="utf-8"?>
+<p:sld xmlns:a="http://schemas.openxmlformats.org/drawingml/2006/main" xmlns:r="http://schemas.openxmlformats.org/officeDocument/2006/relationships" xmlns:p="http://schemas.openxmlformats.org/presentationml/2006/main">
+  <p:cSld>
+    <p:spTree>
+      <p:nvGrpSpPr>
+        <p:cNvPr id="1" name=""/>
+        <p:cNvGrpSpPr/>
+        <p:nvPr/>
+      </p:nvGrpSpPr>
+      <p:grpSpPr>
+        <a:xfrm>
+          <a:off x="0" y="0"/>
+          <a:ext cx="0" cy="0"/>
+          <a:chOff x="0" y="0"/>
+          <a:chExt cx="0" cy="0"/>
+        </a:xfrm>
+      </p:grpSpPr>
+      <p:sp>
+        <p:nvSpPr>
+          <p:cNvPr id="2" name="Title 1"/>
+          <p:cNvSpPr>
+            <a:spLocks noGrp="1"/>
+          </p:cNvSpPr>
+          <p:nvPr>
+            <p:ph type="title"/>
+          </p:nvPr>
+        </p:nvSpPr>
+        <p:spPr/>
+        <p:txBody>
+          <a:bodyPr/>
+          <a:lstStyle/>
+          <a:p>
+            <a:r>
+              <a:rPr lang="en-US" smtClean="0"/>
+              <a:t>Immutability</a:t>
+            </a:r>
+            <a:endParaRPr lang="en-US" dirty="0"/>
+          </a:p>
+        </p:txBody>
+      </p:sp>
+      <p:sp>
+        <p:nvSpPr>
+          <p:cNvPr id="3" name="Content Placeholder 2"/>
+          <p:cNvSpPr>
+            <a:spLocks noGrp="1"/>
+          </p:cNvSpPr>
+          <p:nvPr>
+            <p:ph idx="1"/>
+          </p:nvPr>
+        </p:nvSpPr>
+        <p:spPr/>
+        <p:txBody>
+          <a:bodyPr/>
+          <a:lstStyle/>
+          <a:p>
+            <a:r>
+              <a:rPr lang="en-US" dirty="0" smtClean="0"/>
+              <a:t>Code Break</a:t>
+            </a:r>
+          </a:p>
+          <a:p>
+            <a:r>
+              <a:rPr lang="en-US" dirty="0" smtClean="0"/>
+              <a:t>Databases CRUD (Create, Read, Update, Delete)</a:t>
+            </a:r>
+          </a:p>
+          <a:p>
+            <a:r>
+              <a:rPr lang="en-US" dirty="0" smtClean="0"/>
+              <a:t>Immutable Data No: Update &amp; Delete</a:t>
+            </a:r>
+          </a:p>
+          <a:p>
+            <a:endParaRPr lang="en-US" dirty="0" smtClean="0"/>
+          </a:p>
+          <a:p>
+            <a:r>
+              <a:rPr lang="en-US" dirty="0" smtClean="0"/>
+              <a:t>Why?</a:t>
+            </a:r>
+          </a:p>
+          <a:p>
+            <a:pPr lvl="1"/>
+            <a:r>
+              <a:rPr lang="en-US" dirty="0" smtClean="0"/>
+              <a:t>Code has bugs</a:t>
+            </a:r>
+          </a:p>
+          <a:p>
+            <a:pPr lvl="1"/>
+            <a:r>
+              <a:rPr lang="en-US" dirty="0" smtClean="0"/>
+              <a:t>People make mistakes</a:t>
+            </a:r>
+          </a:p>
+          <a:p>
+            <a:pPr lvl="1"/>
+            <a:r>
+              <a:rPr lang="en-US" dirty="0" smtClean="0"/>
+              <a:t>Having an Immutable Data Source means can always replay events </a:t>
+            </a:r>
+          </a:p>
+          <a:p>
+            <a:pPr lvl="1"/>
+            <a:r>
+              <a:rPr lang="en-US" dirty="0" smtClean="0"/>
+              <a:t>Also gives you audit logging. (How did we get to the state we are in)</a:t>
+            </a:r>
+          </a:p>
+          <a:p>
+            <a:endParaRPr lang="en-US" dirty="0"/>
+          </a:p>
+        </p:txBody>
+      </p:sp>
+    </p:spTree>
+    <p:extLst>
+      <p:ext uri="{BB962C8B-B14F-4D97-AF65-F5344CB8AC3E}">
+        <p14:creationId xmlns:p14="http://schemas.microsoft.com/office/powerpoint/2010/main" val="3257081856"/>
+      </p:ext>
+    </p:extLst>
+  </p:cSld>
+  <p:clrMapOvr>
+    <a:masterClrMapping/>
+  </p:clrMapOvr>
+</p:sld>
+</file>
+
+<file path=ppt/slides/slide22.xml><?xml version="1.0" encoding="utf-8"?>
+<p:sld xmlns:a="http://schemas.openxmlformats.org/drawingml/2006/main" xmlns:r="http://schemas.openxmlformats.org/officeDocument/2006/relationships" xmlns:p="http://schemas.openxmlformats.org/presentationml/2006/main">
+  <p:cSld>
+    <p:spTree>
+      <p:nvGrpSpPr>
+        <p:cNvPr id="1" name=""/>
+        <p:cNvGrpSpPr/>
+        <p:nvPr/>
+      </p:nvGrpSpPr>
+      <p:grpSpPr>
+        <a:xfrm>
+          <a:off x="0" y="0"/>
+          <a:ext cx="0" cy="0"/>
+          <a:chOff x="0" y="0"/>
+          <a:chExt cx="0" cy="0"/>
+        </a:xfrm>
+      </p:grpSpPr>
+      <p:sp>
+        <p:nvSpPr>
+          <p:cNvPr id="2" name="Title 1"/>
+          <p:cNvSpPr>
+            <a:spLocks noGrp="1"/>
+          </p:cNvSpPr>
+          <p:nvPr>
+            <p:ph type="title"/>
+          </p:nvPr>
+        </p:nvSpPr>
+        <p:spPr/>
+        <p:txBody>
+          <a:bodyPr/>
+          <a:lstStyle/>
+          <a:p>
+            <a:r>
+              <a:rPr lang="en-US" dirty="0" smtClean="0"/>
+              <a:t>Immutability</a:t>
+            </a:r>
+            <a:endParaRPr lang="en-US" dirty="0"/>
+          </a:p>
+        </p:txBody>
+      </p:sp>
+      <p:sp>
+        <p:nvSpPr>
+          <p:cNvPr id="3" name="Content Placeholder 2"/>
+          <p:cNvSpPr>
+            <a:spLocks noGrp="1"/>
+          </p:cNvSpPr>
+          <p:nvPr>
+            <p:ph idx="1"/>
+          </p:nvPr>
+        </p:nvSpPr>
+        <p:spPr/>
+        <p:txBody>
+          <a:bodyPr/>
+          <a:lstStyle/>
+          <a:p>
+            <a:r>
+              <a:rPr lang="en-US" dirty="0" smtClean="0"/>
+              <a:t>Purely Immutable data stores aren’t practical </a:t>
+            </a:r>
+          </a:p>
+          <a:p>
+            <a:r>
+              <a:rPr lang="en-US" dirty="0" smtClean="0"/>
+              <a:t>Immutable Data Rows &amp; View Rows</a:t>
+            </a:r>
+          </a:p>
+          <a:p>
+            <a:endParaRPr lang="en-US" dirty="0"/>
+          </a:p>
+          <a:p>
+            <a:r>
+              <a:rPr lang="en-US" dirty="0" smtClean="0"/>
+              <a:t>View Rows</a:t>
+            </a:r>
+          </a:p>
+          <a:p>
+            <a:pPr lvl="1"/>
+            <a:r>
+              <a:rPr lang="en-US" dirty="0" smtClean="0"/>
+              <a:t>Can be updated &amp; deleted</a:t>
+            </a:r>
+          </a:p>
+          <a:p>
+            <a:pPr lvl="1"/>
+            <a:r>
+              <a:rPr lang="en-US" dirty="0" smtClean="0"/>
+              <a:t>Can always be reconstructed from the Immutable data rows</a:t>
+            </a:r>
+          </a:p>
+          <a:p>
+            <a:endParaRPr lang="en-US" dirty="0" smtClean="0"/>
+          </a:p>
+          <a:p>
+            <a:pPr marL="0" indent="0">
+              <a:buNone/>
+            </a:pPr>
+            <a:endParaRPr lang="en-US" dirty="0"/>
+          </a:p>
+        </p:txBody>
+      </p:sp>
+    </p:spTree>
+    <p:extLst>
+      <p:ext uri="{BB962C8B-B14F-4D97-AF65-F5344CB8AC3E}">
+        <p14:creationId xmlns:p14="http://schemas.microsoft.com/office/powerpoint/2010/main" val="2930620304"/>
+      </p:ext>
+    </p:extLst>
+  </p:cSld>
+  <p:clrMapOvr>
+    <a:masterClrMapping/>
+  </p:clrMapOvr>
+</p:sld>
+</file>
+
+<file path=ppt/slides/slide23.xml><?xml version="1.0" encoding="utf-8"?>
+<p:sld xmlns:a="http://schemas.openxmlformats.org/drawingml/2006/main" xmlns:r="http://schemas.openxmlformats.org/officeDocument/2006/relationships" xmlns:p="http://schemas.openxmlformats.org/presentationml/2006/main">
+  <p:cSld>
+    <p:spTree>
+      <p:nvGrpSpPr>
+        <p:cNvPr id="1" name=""/>
+        <p:cNvGrpSpPr/>
+        <p:nvPr/>
+      </p:nvGrpSpPr>
+      <p:grpSpPr>
+        <a:xfrm>
+          <a:off x="0" y="0"/>
+          <a:ext cx="0" cy="0"/>
+          <a:chOff x="0" y="0"/>
+          <a:chExt cx="0" cy="0"/>
+        </a:xfrm>
+      </p:grpSpPr>
+      <p:sp>
+        <p:nvSpPr>
+          <p:cNvPr id="2" name="Title 1"/>
+          <p:cNvSpPr>
+            <a:spLocks noGrp="1"/>
+          </p:cNvSpPr>
+          <p:nvPr>
+            <p:ph type="title"/>
+          </p:nvPr>
+        </p:nvSpPr>
+        <p:spPr/>
+        <p:txBody>
+          <a:bodyPr/>
+          <a:lstStyle/>
+          <a:p>
+            <a:r>
+              <a:rPr lang="en-US" dirty="0" smtClean="0"/>
+              <a:t>Immutability Benefits</a:t>
+            </a:r>
+            <a:endParaRPr lang="en-US" dirty="0"/>
+          </a:p>
+        </p:txBody>
+      </p:sp>
+      <p:sp>
+        <p:nvSpPr>
+          <p:cNvPr id="3" name="Content Placeholder 2"/>
+          <p:cNvSpPr>
+            <a:spLocks noGrp="1"/>
+          </p:cNvSpPr>
+          <p:nvPr>
+            <p:ph idx="1"/>
+          </p:nvPr>
+        </p:nvSpPr>
+        <p:spPr/>
+        <p:txBody>
+          <a:bodyPr/>
+          <a:lstStyle/>
+          <a:p>
+            <a:r>
+              <a:rPr lang="en-US" dirty="0" smtClean="0"/>
+              <a:t>Idempotent Batch Writes (insert data row &amp; update view row in same batch)</a:t>
+            </a:r>
+          </a:p>
+          <a:p>
+            <a:r>
+              <a:rPr lang="en-US" dirty="0" smtClean="0"/>
+              <a:t>Flexibility to add new views later </a:t>
+            </a:r>
+          </a:p>
+          <a:p>
+            <a:r>
+              <a:rPr lang="en-US" dirty="0" smtClean="0"/>
+              <a:t>Audit Log (helpful for debug or community management)</a:t>
+            </a:r>
+          </a:p>
+          <a:p>
+            <a:pPr marL="0" indent="0">
+              <a:buNone/>
+            </a:pPr>
+            <a:endParaRPr lang="en-US" dirty="0" smtClean="0"/>
+          </a:p>
+          <a:p>
+            <a:endParaRPr lang="en-US" dirty="0"/>
+          </a:p>
+        </p:txBody>
+      </p:sp>
+    </p:spTree>
+    <p:extLst>
+      <p:ext uri="{BB962C8B-B14F-4D97-AF65-F5344CB8AC3E}">
+        <p14:creationId xmlns:p14="http://schemas.microsoft.com/office/powerpoint/2010/main" val="4289292108"/>
+      </p:ext>
+    </p:extLst>
+  </p:cSld>
+  <p:clrMapOvr>
+    <a:masterClrMapping/>
+  </p:clrMapOvr>
+</p:sld>
+</file>
+
+<file path=ppt/slides/slide24.xml><?xml version="1.0" encoding="utf-8"?>
+<p:sld xmlns:a="http://schemas.openxmlformats.org/drawingml/2006/main" xmlns:r="http://schemas.openxmlformats.org/officeDocument/2006/relationships" xmlns:p="http://schemas.openxmlformats.org/presentationml/2006/main">
+  <p:cSld>
+    <p:spTree>
+      <p:nvGrpSpPr>
+        <p:cNvPr id="1" name=""/>
+        <p:cNvGrpSpPr/>
+        <p:nvPr/>
+      </p:nvGrpSpPr>
+      <p:grpSpPr>
+        <a:xfrm>
+          <a:off x="0" y="0"/>
+          <a:ext cx="0" cy="0"/>
+          <a:chOff x="0" y="0"/>
+          <a:chExt cx="0" cy="0"/>
+        </a:xfrm>
+      </p:grpSpPr>
+      <p:sp>
+        <p:nvSpPr>
+          <p:cNvPr id="2" name="Title 1"/>
+          <p:cNvSpPr>
+            <a:spLocks noGrp="1"/>
+          </p:cNvSpPr>
+          <p:nvPr>
+            <p:ph type="title"/>
+          </p:nvPr>
+        </p:nvSpPr>
+        <p:spPr>
+          <a:xfrm>
+            <a:off x="716706" y="294786"/>
+            <a:ext cx="10515600" cy="1325563"/>
+          </a:xfrm>
+        </p:spPr>
+        <p:txBody>
+          <a:bodyPr/>
+          <a:lstStyle/>
+          <a:p>
+            <a:r>
+              <a:rPr lang="en-US" dirty="0" err="1" smtClean="0"/>
+              <a:t>SimpleStats</a:t>
+            </a:r>
+            <a:r>
+              <a:rPr lang="en-US" dirty="0" smtClean="0"/>
+              <a:t>: Process Stats</a:t>
+            </a:r>
+            <a:endParaRPr lang="en-US" dirty="0"/>
+          </a:p>
+        </p:txBody>
+      </p:sp>
+      <p:sp>
+        <p:nvSpPr>
+          <p:cNvPr id="3" name="Content Placeholder 2"/>
+          <p:cNvSpPr>
+            <a:spLocks noGrp="1"/>
+          </p:cNvSpPr>
+          <p:nvPr>
+            <p:ph idx="1"/>
+          </p:nvPr>
+        </p:nvSpPr>
+        <p:spPr>
+          <a:xfrm>
+            <a:off x="838200" y="1825625"/>
+            <a:ext cx="4091887" cy="4351338"/>
+          </a:xfrm>
+        </p:spPr>
+        <p:txBody>
+          <a:bodyPr>
+            <a:normAutofit fontScale="55000" lnSpcReduction="20000"/>
+          </a:bodyPr>
+          <a:lstStyle/>
+          <a:p>
+            <a:pPr marL="0" indent="0">
+              <a:buNone/>
+            </a:pPr>
+            <a:r>
+              <a:rPr lang="en-US" dirty="0"/>
+              <a:t>// Create the batch operation.</a:t>
+            </a:r>
+          </a:p>
+          <a:p>
+            <a:pPr marL="0" indent="0">
+              <a:buNone/>
+            </a:pPr>
+            <a:r>
+              <a:rPr lang="en-US" dirty="0" err="1" smtClean="0"/>
+              <a:t>var</a:t>
+            </a:r>
+            <a:r>
+              <a:rPr lang="en-US" dirty="0" smtClean="0"/>
+              <a:t> </a:t>
+            </a:r>
+            <a:r>
+              <a:rPr lang="en-US" dirty="0" err="1"/>
+              <a:t>batchOperation</a:t>
+            </a:r>
+            <a:r>
+              <a:rPr lang="en-US" dirty="0"/>
+              <a:t> = new </a:t>
+            </a:r>
+            <a:r>
+              <a:rPr lang="en-US" dirty="0" err="1"/>
+              <a:t>TableBatchOperation</a:t>
+            </a:r>
+            <a:r>
+              <a:rPr lang="en-US" dirty="0"/>
+              <a:t>();</a:t>
+            </a:r>
+          </a:p>
+          <a:p>
+            <a:pPr marL="0" indent="0">
+              <a:buNone/>
+            </a:pPr>
+            <a:r>
+              <a:rPr lang="en-US" dirty="0" err="1" smtClean="0"/>
+              <a:t>var</a:t>
+            </a:r>
+            <a:r>
+              <a:rPr lang="en-US" dirty="0" smtClean="0"/>
+              <a:t> </a:t>
+            </a:r>
+            <a:r>
+              <a:rPr lang="en-US" dirty="0"/>
+              <a:t>player = </a:t>
+            </a:r>
+            <a:r>
+              <a:rPr lang="en-US" dirty="0" err="1"/>
+              <a:t>PlayerEntity.GetPlayerEntity</a:t>
+            </a:r>
+            <a:r>
+              <a:rPr lang="en-US" dirty="0"/>
+              <a:t>(</a:t>
+            </a:r>
+            <a:r>
+              <a:rPr lang="en-US" dirty="0" err="1"/>
+              <a:t>playerId</a:t>
+            </a:r>
+            <a:r>
+              <a:rPr lang="en-US" dirty="0"/>
+              <a:t>);</a:t>
+            </a:r>
+          </a:p>
+          <a:p>
+            <a:pPr marL="0" indent="0">
+              <a:buNone/>
+            </a:pPr>
+            <a:r>
+              <a:rPr lang="en-US" dirty="0" err="1" smtClean="0"/>
+              <a:t>batchOperation.InsertOrReplace</a:t>
+            </a:r>
+            <a:r>
+              <a:rPr lang="en-US" dirty="0" smtClean="0"/>
+              <a:t>(player);</a:t>
+            </a:r>
+          </a:p>
+          <a:p>
+            <a:pPr marL="0" indent="0">
+              <a:buNone/>
+            </a:pPr>
+            <a:endParaRPr lang="en-US" dirty="0"/>
+          </a:p>
+          <a:p>
+            <a:pPr marL="0" indent="0">
+              <a:buNone/>
+            </a:pPr>
+            <a:r>
+              <a:rPr lang="en-US" dirty="0" smtClean="0"/>
+              <a:t>//</a:t>
+            </a:r>
+            <a:r>
+              <a:rPr lang="en-US" dirty="0"/>
+              <a:t>Update Player Entity with Game </a:t>
+            </a:r>
+            <a:r>
+              <a:rPr lang="en-US" dirty="0" smtClean="0"/>
+              <a:t>Data</a:t>
+            </a:r>
+          </a:p>
+          <a:p>
+            <a:pPr marL="0" indent="0">
+              <a:buNone/>
+            </a:pPr>
+            <a:r>
+              <a:rPr lang="en-US" dirty="0" err="1" smtClean="0"/>
+              <a:t>player.TotalDeaths</a:t>
+            </a:r>
+            <a:r>
+              <a:rPr lang="en-US" dirty="0" smtClean="0"/>
+              <a:t> += </a:t>
+            </a:r>
+            <a:r>
+              <a:rPr lang="en-US" dirty="0" err="1" smtClean="0"/>
+              <a:t>gameData.Deaths</a:t>
+            </a:r>
+            <a:r>
+              <a:rPr lang="en-US" dirty="0" smtClean="0"/>
+              <a:t>;</a:t>
+            </a:r>
+          </a:p>
+          <a:p>
+            <a:pPr marL="0" indent="0">
+              <a:buNone/>
+            </a:pPr>
+            <a:r>
+              <a:rPr lang="en-US" dirty="0" err="1" smtClean="0"/>
+              <a:t>player.TotalKills</a:t>
+            </a:r>
+            <a:r>
+              <a:rPr lang="en-US" dirty="0" smtClean="0"/>
+              <a:t> </a:t>
+            </a:r>
+            <a:r>
+              <a:rPr lang="en-US" dirty="0"/>
+              <a:t>+= </a:t>
+            </a:r>
+            <a:r>
+              <a:rPr lang="en-US" dirty="0" err="1"/>
+              <a:t>gameData.Kills</a:t>
+            </a:r>
+            <a:r>
+              <a:rPr lang="en-US" dirty="0"/>
+              <a:t>;</a:t>
+            </a:r>
+          </a:p>
+          <a:p>
+            <a:pPr marL="0" indent="0">
+              <a:buNone/>
+            </a:pPr>
+            <a:r>
+              <a:rPr lang="en-US" dirty="0" err="1" smtClean="0"/>
+              <a:t>player.TotalPoints</a:t>
+            </a:r>
+            <a:r>
+              <a:rPr lang="en-US" dirty="0" smtClean="0"/>
+              <a:t> </a:t>
+            </a:r>
+            <a:r>
+              <a:rPr lang="en-US" dirty="0"/>
+              <a:t>+= </a:t>
+            </a:r>
+            <a:r>
+              <a:rPr lang="en-US" dirty="0" err="1"/>
+              <a:t>gameData.Points</a:t>
+            </a:r>
+            <a:r>
+              <a:rPr lang="en-US" dirty="0"/>
+              <a:t>;</a:t>
+            </a:r>
+          </a:p>
+          <a:p>
+            <a:pPr marL="0" indent="0">
+              <a:buNone/>
+            </a:pPr>
+            <a:r>
+              <a:rPr lang="en-US" dirty="0" err="1" smtClean="0"/>
+              <a:t>player.TotalWins</a:t>
+            </a:r>
+            <a:r>
+              <a:rPr lang="en-US" dirty="0" smtClean="0"/>
+              <a:t> </a:t>
+            </a:r>
+            <a:r>
+              <a:rPr lang="en-US" dirty="0"/>
+              <a:t>+= </a:t>
+            </a:r>
+            <a:r>
+              <a:rPr lang="en-US" dirty="0" err="1"/>
+              <a:t>gameData.Win</a:t>
+            </a:r>
+            <a:r>
+              <a:rPr lang="en-US" dirty="0"/>
+              <a:t> ? 1 : 0;</a:t>
+            </a:r>
+          </a:p>
+          <a:p>
+            <a:pPr marL="0" indent="0">
+              <a:buNone/>
+            </a:pPr>
+            <a:r>
+              <a:rPr lang="en-US" dirty="0" err="1" smtClean="0"/>
+              <a:t>player.TotalGames</a:t>
+            </a:r>
+            <a:r>
+              <a:rPr lang="en-US" dirty="0" smtClean="0"/>
+              <a:t> </a:t>
+            </a:r>
+            <a:r>
+              <a:rPr lang="en-US" dirty="0"/>
+              <a:t>+= 1;</a:t>
+            </a:r>
+          </a:p>
+          <a:p>
+            <a:pPr marL="0" indent="0">
+              <a:buNone/>
+            </a:pPr>
+            <a:r>
+              <a:rPr lang="en-US" dirty="0" err="1" smtClean="0"/>
+              <a:t>player.TotalSecondsPlayed</a:t>
+            </a:r>
+            <a:r>
+              <a:rPr lang="en-US" dirty="0" smtClean="0"/>
+              <a:t> </a:t>
+            </a:r>
+            <a:r>
+              <a:rPr lang="en-US" dirty="0"/>
+              <a:t>+= </a:t>
+            </a:r>
+            <a:r>
+              <a:rPr lang="en-US" dirty="0" err="1"/>
+              <a:t>gameSeconds</a:t>
+            </a:r>
+            <a:r>
+              <a:rPr lang="en-US" dirty="0"/>
+              <a:t>;</a:t>
+            </a:r>
+          </a:p>
+          <a:p>
+            <a:pPr marL="0" indent="0">
+              <a:buNone/>
+            </a:pPr>
+            <a:endParaRPr lang="en-US" dirty="0"/>
+          </a:p>
+        </p:txBody>
+      </p:sp>
+      <p:sp>
+        <p:nvSpPr>
+          <p:cNvPr id="4" name="TextBox 3"/>
+          <p:cNvSpPr txBox="1"/>
+          <p:nvPr/>
+        </p:nvSpPr>
+        <p:spPr>
+          <a:xfrm>
+            <a:off x="5774149" y="1684948"/>
+            <a:ext cx="6308614" cy="3816429"/>
+          </a:xfrm>
+          <a:prstGeom prst="rect">
+            <a:avLst/>
+          </a:prstGeom>
+          <a:noFill/>
+        </p:spPr>
+        <p:txBody>
+          <a:bodyPr wrap="square" rtlCol="0">
+            <a:spAutoFit/>
+          </a:bodyPr>
+          <a:lstStyle/>
+          <a:p>
+            <a:r>
+              <a:rPr lang="en-US" sz="1500" dirty="0"/>
+              <a:t> //Create </a:t>
+            </a:r>
+            <a:r>
+              <a:rPr lang="en-US" sz="1500" dirty="0" err="1"/>
+              <a:t>PlayerGame</a:t>
+            </a:r>
+            <a:r>
+              <a:rPr lang="en-US" sz="1500" dirty="0"/>
+              <a:t> Row</a:t>
+            </a:r>
+          </a:p>
+          <a:p>
+            <a:r>
+              <a:rPr lang="en-US" sz="1500" dirty="0" err="1"/>
+              <a:t>v</a:t>
+            </a:r>
+            <a:r>
+              <a:rPr lang="en-US" sz="1500" dirty="0" err="1" smtClean="0"/>
+              <a:t>ar</a:t>
+            </a:r>
+            <a:r>
+              <a:rPr lang="en-US" sz="1500" dirty="0" smtClean="0"/>
+              <a:t> </a:t>
+            </a:r>
+            <a:r>
+              <a:rPr lang="en-US" sz="1500" dirty="0" err="1" smtClean="0"/>
+              <a:t>playerGame</a:t>
+            </a:r>
+            <a:r>
+              <a:rPr lang="en-US" sz="1500" dirty="0" smtClean="0"/>
+              <a:t> </a:t>
+            </a:r>
+            <a:r>
+              <a:rPr lang="en-US" sz="1500" dirty="0"/>
+              <a:t>= new </a:t>
+            </a:r>
+            <a:r>
+              <a:rPr lang="en-US" sz="1500" dirty="0" err="1"/>
+              <a:t>PlayerGameEntity</a:t>
+            </a:r>
+            <a:r>
+              <a:rPr lang="en-US" sz="1500" dirty="0"/>
+              <a:t>(</a:t>
+            </a:r>
+            <a:r>
+              <a:rPr lang="en-US" sz="1500" dirty="0" err="1"/>
+              <a:t>playerId</a:t>
+            </a:r>
+            <a:r>
+              <a:rPr lang="en-US" sz="1500" dirty="0"/>
+              <a:t>, </a:t>
+            </a:r>
+            <a:r>
+              <a:rPr lang="en-US" sz="1500" dirty="0" err="1"/>
+              <a:t>gameId</a:t>
+            </a:r>
+            <a:r>
+              <a:rPr lang="en-US" sz="1500" dirty="0"/>
+              <a:t>)</a:t>
+            </a:r>
+          </a:p>
+          <a:p>
+            <a:r>
+              <a:rPr lang="en-US" sz="1500" dirty="0" smtClean="0"/>
+              <a:t>{</a:t>
+            </a:r>
+            <a:endParaRPr lang="en-US" sz="1500" dirty="0"/>
+          </a:p>
+          <a:p>
+            <a:r>
+              <a:rPr lang="en-US" sz="1500" dirty="0" smtClean="0"/>
+              <a:t>	Points </a:t>
+            </a:r>
+            <a:r>
+              <a:rPr lang="en-US" sz="1500" dirty="0"/>
+              <a:t>= </a:t>
+            </a:r>
+            <a:r>
+              <a:rPr lang="en-US" sz="1500" dirty="0" err="1"/>
+              <a:t>gameData.Points</a:t>
+            </a:r>
+            <a:r>
+              <a:rPr lang="en-US" sz="1500" dirty="0"/>
+              <a:t>,</a:t>
+            </a:r>
+          </a:p>
+          <a:p>
+            <a:r>
+              <a:rPr lang="en-US" sz="1500" dirty="0"/>
+              <a:t>           </a:t>
+            </a:r>
+            <a:r>
+              <a:rPr lang="en-US" sz="1500" dirty="0" smtClean="0"/>
+              <a:t>Win </a:t>
+            </a:r>
+            <a:r>
+              <a:rPr lang="en-US" sz="1500" dirty="0"/>
+              <a:t>= </a:t>
+            </a:r>
+            <a:r>
+              <a:rPr lang="en-US" sz="1500" dirty="0" err="1"/>
+              <a:t>gameData.Win</a:t>
+            </a:r>
+            <a:r>
+              <a:rPr lang="en-US" sz="1500" dirty="0"/>
+              <a:t>,</a:t>
+            </a:r>
+          </a:p>
+          <a:p>
+            <a:r>
+              <a:rPr lang="en-US" sz="1500" dirty="0"/>
+              <a:t>           </a:t>
+            </a:r>
+            <a:r>
+              <a:rPr lang="en-US" sz="1500" dirty="0" smtClean="0"/>
+              <a:t>Kills </a:t>
+            </a:r>
+            <a:r>
+              <a:rPr lang="en-US" sz="1500" dirty="0"/>
+              <a:t>= </a:t>
+            </a:r>
+            <a:r>
+              <a:rPr lang="en-US" sz="1500" dirty="0" err="1"/>
+              <a:t>gameData.Kills</a:t>
+            </a:r>
+            <a:r>
+              <a:rPr lang="en-US" sz="1500" dirty="0"/>
+              <a:t>,</a:t>
+            </a:r>
+          </a:p>
+          <a:p>
+            <a:r>
+              <a:rPr lang="en-US" sz="1500" dirty="0"/>
+              <a:t>           </a:t>
+            </a:r>
+            <a:r>
+              <a:rPr lang="en-US" sz="1500" dirty="0" smtClean="0"/>
+              <a:t>Deaths </a:t>
+            </a:r>
+            <a:r>
+              <a:rPr lang="en-US" sz="1500" dirty="0"/>
+              <a:t>= </a:t>
+            </a:r>
+            <a:r>
+              <a:rPr lang="en-US" sz="1500" dirty="0" err="1"/>
+              <a:t>gameData.Deaths</a:t>
+            </a:r>
+            <a:r>
+              <a:rPr lang="en-US" sz="1500" dirty="0"/>
+              <a:t>,</a:t>
+            </a:r>
+          </a:p>
+          <a:p>
+            <a:r>
+              <a:rPr lang="en-US" sz="1500" dirty="0"/>
+              <a:t>           </a:t>
+            </a:r>
+            <a:r>
+              <a:rPr lang="en-US" sz="1500" dirty="0" err="1" smtClean="0"/>
+              <a:t>GameDuration</a:t>
+            </a:r>
+            <a:r>
+              <a:rPr lang="en-US" sz="1500" dirty="0" smtClean="0"/>
+              <a:t> </a:t>
+            </a:r>
+            <a:r>
+              <a:rPr lang="en-US" sz="1500" dirty="0"/>
+              <a:t>= </a:t>
+            </a:r>
+            <a:r>
+              <a:rPr lang="en-US" sz="1500" dirty="0" err="1"/>
+              <a:t>gameSeconds</a:t>
+            </a:r>
+            <a:endParaRPr lang="en-US" sz="1500" dirty="0"/>
+          </a:p>
+          <a:p>
+            <a:r>
+              <a:rPr lang="en-US" sz="1500" dirty="0" smtClean="0"/>
+              <a:t>};</a:t>
+            </a:r>
+            <a:endParaRPr lang="en-US" sz="1500" dirty="0"/>
+          </a:p>
+          <a:p>
+            <a:endParaRPr lang="en-US" sz="1500" dirty="0" smtClean="0"/>
+          </a:p>
+          <a:p>
+            <a:r>
+              <a:rPr lang="en-US" sz="1500" dirty="0" err="1" smtClean="0"/>
+              <a:t>batchOperation.Insert</a:t>
+            </a:r>
+            <a:r>
+              <a:rPr lang="en-US" sz="1500" dirty="0" smtClean="0"/>
+              <a:t>(</a:t>
+            </a:r>
+            <a:r>
+              <a:rPr lang="en-US" sz="1500" dirty="0" err="1" smtClean="0"/>
+              <a:t>playerGame</a:t>
+            </a:r>
+            <a:r>
+              <a:rPr lang="en-US" sz="1500" dirty="0" smtClean="0"/>
+              <a:t>);</a:t>
+            </a:r>
+          </a:p>
+          <a:p>
+            <a:endParaRPr lang="en-US" sz="1500" dirty="0"/>
+          </a:p>
+          <a:p>
+            <a:endParaRPr lang="en-US" sz="1600" dirty="0" smtClean="0"/>
+          </a:p>
+          <a:p>
+            <a:r>
+              <a:rPr lang="en-US" sz="1500" dirty="0" err="1" smtClean="0"/>
+              <a:t>PlayersTable.ExecuteBatch</a:t>
+            </a:r>
+            <a:r>
+              <a:rPr lang="en-US" sz="1500" dirty="0" smtClean="0"/>
+              <a:t>(</a:t>
+            </a:r>
+            <a:r>
+              <a:rPr lang="en-US" sz="1500" dirty="0" err="1" smtClean="0"/>
+              <a:t>batchOperation</a:t>
+            </a:r>
+            <a:r>
+              <a:rPr lang="en-US" sz="1500" dirty="0"/>
+              <a:t>);</a:t>
+            </a:r>
+            <a:endParaRPr lang="en-US" sz="1500" dirty="0" smtClean="0"/>
+          </a:p>
+          <a:p>
+            <a:endParaRPr lang="en-US" sz="1500" dirty="0"/>
+          </a:p>
+          <a:p>
+            <a:endParaRPr lang="en-US" sz="1500" dirty="0"/>
+          </a:p>
+        </p:txBody>
+      </p:sp>
+    </p:spTree>
+    <p:extLst>
+      <p:ext uri="{BB962C8B-B14F-4D97-AF65-F5344CB8AC3E}">
+        <p14:creationId xmlns:p14="http://schemas.microsoft.com/office/powerpoint/2010/main" val="3786481421"/>
+      </p:ext>
+    </p:extLst>
+  </p:cSld>
+  <p:clrMapOvr>
+    <a:masterClrMapping/>
+  </p:clrMapOvr>
+</p:sld>
+</file>
+
+<file path=ppt/slides/slide25.xml><?xml version="1.0" encoding="utf-8"?>
+<p:sld xmlns:a="http://schemas.openxmlformats.org/drawingml/2006/main" xmlns:r="http://schemas.openxmlformats.org/officeDocument/2006/relationships" xmlns:p="http://schemas.openxmlformats.org/presentationml/2006/main">
+  <p:cSld>
+    <p:spTree>
+      <p:nvGrpSpPr>
+        <p:cNvPr id="1" name=""/>
+        <p:cNvGrpSpPr/>
+        <p:nvPr/>
+      </p:nvGrpSpPr>
+      <p:grpSpPr>
+        <a:xfrm>
+          <a:off x="0" y="0"/>
+          <a:ext cx="0" cy="0"/>
+          <a:chOff x="0" y="0"/>
+          <a:chExt cx="0" cy="0"/>
+        </a:xfrm>
+      </p:grpSpPr>
+      <p:sp>
+        <p:nvSpPr>
+          <p:cNvPr id="2" name="Title 1"/>
+          <p:cNvSpPr>
+            <a:spLocks noGrp="1"/>
+          </p:cNvSpPr>
+          <p:nvPr>
+            <p:ph type="title"/>
+          </p:nvPr>
+        </p:nvSpPr>
+        <p:spPr/>
+        <p:txBody>
+          <a:bodyPr/>
+          <a:lstStyle/>
+          <a:p>
+            <a:r>
+              <a:rPr lang="en-US" dirty="0" smtClean="0"/>
+              <a:t>Show What Partition Would Look Like</a:t>
+            </a:r>
+            <a:endParaRPr lang="en-US" dirty="0"/>
+          </a:p>
+        </p:txBody>
+      </p:sp>
+      <p:sp>
+        <p:nvSpPr>
+          <p:cNvPr id="3" name="Content Placeholder 2"/>
+          <p:cNvSpPr>
+            <a:spLocks noGrp="1"/>
+          </p:cNvSpPr>
+          <p:nvPr>
+            <p:ph idx="1"/>
+          </p:nvPr>
+        </p:nvSpPr>
+        <p:spPr/>
+        <p:txBody>
+          <a:bodyPr/>
+          <a:lstStyle/>
+          <a:p>
+            <a:endParaRPr lang="en-US"/>
+          </a:p>
+        </p:txBody>
+      </p:sp>
+    </p:spTree>
+    <p:extLst>
+      <p:ext uri="{BB962C8B-B14F-4D97-AF65-F5344CB8AC3E}">
+        <p14:creationId xmlns:p14="http://schemas.microsoft.com/office/powerpoint/2010/main" val="3582414993"/>
+      </p:ext>
+    </p:extLst>
+  </p:cSld>
+  <p:clrMapOvr>
+    <a:masterClrMapping/>
+  </p:clrMapOvr>
+</p:sld>
+</file>
+
+<file path=ppt/slides/slide26.xml><?xml version="1.0" encoding="utf-8"?>
+<p:sld xmlns:a="http://schemas.openxmlformats.org/drawingml/2006/main" xmlns:r="http://schemas.openxmlformats.org/officeDocument/2006/relationships" xmlns:p="http://schemas.openxmlformats.org/presentationml/2006/main">
+  <p:cSld>
+    <p:spTree>
+      <p:nvGrpSpPr>
+        <p:cNvPr id="1" name=""/>
+        <p:cNvGrpSpPr/>
+        <p:nvPr/>
+      </p:nvGrpSpPr>
+      <p:grpSpPr>
+        <a:xfrm>
+          <a:off x="0" y="0"/>
+          <a:ext cx="0" cy="0"/>
+          <a:chOff x="0" y="0"/>
+          <a:chExt cx="0" cy="0"/>
+        </a:xfrm>
+      </p:grpSpPr>
+      <p:sp>
+        <p:nvSpPr>
+          <p:cNvPr id="2" name="Title 1"/>
+          <p:cNvSpPr>
+            <a:spLocks noGrp="1"/>
+          </p:cNvSpPr>
+          <p:nvPr>
+            <p:ph type="title"/>
+          </p:nvPr>
+        </p:nvSpPr>
+        <p:spPr/>
+        <p:txBody>
+          <a:bodyPr/>
+          <a:lstStyle/>
+          <a:p>
+            <a:r>
+              <a:rPr lang="en-US" dirty="0" smtClean="0"/>
+              <a:t>What About Distributed Transactions</a:t>
+            </a:r>
+            <a:endParaRPr lang="en-US" dirty="0"/>
+          </a:p>
+        </p:txBody>
+      </p:sp>
+      <p:sp>
+        <p:nvSpPr>
+          <p:cNvPr id="3" name="Content Placeholder 2"/>
+          <p:cNvSpPr>
+            <a:spLocks noGrp="1"/>
+          </p:cNvSpPr>
+          <p:nvPr>
+            <p:ph idx="1"/>
+          </p:nvPr>
+        </p:nvSpPr>
+        <p:spPr/>
+        <p:txBody>
+          <a:bodyPr/>
+          <a:lstStyle/>
+          <a:p>
+            <a:r>
+              <a:rPr lang="en-US" dirty="0" smtClean="0"/>
+              <a:t>I want all the players in a single game to have their stats updated.  </a:t>
+            </a:r>
+            <a:endParaRPr lang="en-US" dirty="0"/>
+          </a:p>
+        </p:txBody>
+      </p:sp>
+    </p:spTree>
+    <p:extLst>
+      <p:ext uri="{BB962C8B-B14F-4D97-AF65-F5344CB8AC3E}">
+        <p14:creationId xmlns:p14="http://schemas.microsoft.com/office/powerpoint/2010/main" val="2190527640"/>
+      </p:ext>
+    </p:extLst>
+  </p:cSld>
+  <p:clrMapOvr>
+    <a:masterClrMapping/>
+  </p:clrMapOvr>
+</p:sld>
+</file>
+
+<file path=ppt/slides/slide27.xml><?xml version="1.0" encoding="utf-8"?>
+<p:sld xmlns:a="http://schemas.openxmlformats.org/drawingml/2006/main" xmlns:r="http://schemas.openxmlformats.org/officeDocument/2006/relationships" xmlns:p="http://schemas.openxmlformats.org/presentationml/2006/main">
+  <p:cSld>
+    <p:spTree>
+      <p:nvGrpSpPr>
+        <p:cNvPr id="1" name=""/>
+        <p:cNvGrpSpPr/>
+        <p:nvPr/>
+      </p:nvGrpSpPr>
+      <p:grpSpPr>
+        <a:xfrm>
+          <a:off x="0" y="0"/>
+          <a:ext cx="0" cy="0"/>
+          <a:chOff x="0" y="0"/>
+          <a:chExt cx="0" cy="0"/>
+        </a:xfrm>
+      </p:grpSpPr>
+      <p:sp>
+        <p:nvSpPr>
+          <p:cNvPr id="2" name="Title 1"/>
+          <p:cNvSpPr>
+            <a:spLocks noGrp="1"/>
+          </p:cNvSpPr>
+          <p:nvPr>
+            <p:ph type="title"/>
+          </p:nvPr>
+        </p:nvSpPr>
+        <p:spPr/>
+        <p:txBody>
+          <a:bodyPr/>
+          <a:lstStyle/>
+          <a:p>
+            <a:r>
+              <a:rPr lang="en-US" dirty="0" smtClean="0"/>
+              <a:t>Google Spanner</a:t>
+            </a:r>
+            <a:endParaRPr lang="en-US" dirty="0"/>
+          </a:p>
+        </p:txBody>
+      </p:sp>
+      <p:sp>
+        <p:nvSpPr>
+          <p:cNvPr id="3" name="Content Placeholder 2"/>
+          <p:cNvSpPr>
+            <a:spLocks noGrp="1"/>
+          </p:cNvSpPr>
+          <p:nvPr>
+            <p:ph idx="1"/>
+          </p:nvPr>
+        </p:nvSpPr>
+        <p:spPr/>
+        <p:txBody>
+          <a:bodyPr/>
+          <a:lstStyle/>
+          <a:p>
+            <a:r>
+              <a:rPr lang="en-US" dirty="0" smtClean="0"/>
+              <a:t>Really Freaking Hard.  </a:t>
+            </a:r>
+          </a:p>
+          <a:p>
+            <a:endParaRPr lang="en-US" dirty="0"/>
+          </a:p>
+        </p:txBody>
+      </p:sp>
+    </p:spTree>
+    <p:extLst>
+      <p:ext uri="{BB962C8B-B14F-4D97-AF65-F5344CB8AC3E}">
+        <p14:creationId xmlns:p14="http://schemas.microsoft.com/office/powerpoint/2010/main" val="3726790128"/>
+      </p:ext>
+    </p:extLst>
+  </p:cSld>
+  <p:clrMapOvr>
+    <a:masterClrMapping/>
+  </p:clrMapOvr>
+</p:sld>
+</file>
+
+<file path=ppt/slides/slide28.xml><?xml version="1.0" encoding="utf-8"?>
+<p:sld xmlns:a="http://schemas.openxmlformats.org/drawingml/2006/main" xmlns:r="http://schemas.openxmlformats.org/officeDocument/2006/relationships" xmlns:p="http://schemas.openxmlformats.org/presentationml/2006/main">
+  <p:cSld>
+    <p:spTree>
+      <p:nvGrpSpPr>
+        <p:cNvPr id="1" name=""/>
+        <p:cNvGrpSpPr/>
+        <p:nvPr/>
+      </p:nvGrpSpPr>
+      <p:grpSpPr>
+        <a:xfrm>
+          <a:off x="0" y="0"/>
+          <a:ext cx="0" cy="0"/>
+          <a:chOff x="0" y="0"/>
+          <a:chExt cx="0" cy="0"/>
+        </a:xfrm>
+      </p:grpSpPr>
+      <p:sp>
+        <p:nvSpPr>
+          <p:cNvPr id="2" name="Title 1"/>
+          <p:cNvSpPr>
+            <a:spLocks noGrp="1"/>
+          </p:cNvSpPr>
+          <p:nvPr>
+            <p:ph type="title"/>
+          </p:nvPr>
+        </p:nvSpPr>
+        <p:spPr/>
+        <p:txBody>
+          <a:bodyPr/>
+          <a:lstStyle/>
+          <a:p>
+            <a:r>
+              <a:rPr lang="en-US" dirty="0" smtClean="0"/>
+              <a:t>Saga Pattern</a:t>
+            </a:r>
+            <a:endParaRPr lang="en-US" dirty="0"/>
+          </a:p>
+        </p:txBody>
+      </p:sp>
+      <p:sp>
+        <p:nvSpPr>
+          <p:cNvPr id="3" name="Content Placeholder 2"/>
+          <p:cNvSpPr>
+            <a:spLocks noGrp="1"/>
+          </p:cNvSpPr>
+          <p:nvPr>
+            <p:ph idx="1"/>
+          </p:nvPr>
+        </p:nvSpPr>
+        <p:spPr/>
+        <p:txBody>
+          <a:bodyPr/>
+          <a:lstStyle/>
+          <a:p>
+            <a:endParaRPr lang="en-US"/>
+          </a:p>
+        </p:txBody>
+      </p:sp>
+    </p:spTree>
+    <p:extLst>
+      <p:ext uri="{BB962C8B-B14F-4D97-AF65-F5344CB8AC3E}">
+        <p14:creationId xmlns:p14="http://schemas.microsoft.com/office/powerpoint/2010/main" val="1307511953"/>
       </p:ext>
     </p:extLst>
   </p:cSld>
@@ -3834,7 +7493,7 @@
           <a:p>
             <a:r>
               <a:rPr lang="en-US" dirty="0" smtClean="0"/>
-              <a:t>Table Partitions – Why do I care?</a:t>
+              <a:t>Properties – Data Types</a:t>
             </a:r>
             <a:endParaRPr lang="en-US" dirty="0"/>
           </a:p>
@@ -3850,54 +7509,250 @@
             <p:ph idx="1"/>
           </p:nvPr>
         </p:nvSpPr>
-        <p:spPr/>
-        <p:txBody>
-          <a:bodyPr/>
-          <a:lstStyle/>
-          <a:p>
-            <a:r>
-              <a:rPr lang="en-US" dirty="0" smtClean="0"/>
-              <a:t>Table Partitions – set of entities with the same partition key value</a:t>
-            </a:r>
-          </a:p>
-          <a:p>
-            <a:r>
-              <a:rPr lang="en-US" dirty="0" smtClean="0"/>
-              <a:t>Single Partition Server handles all requests to a single partition</a:t>
-            </a:r>
-          </a:p>
-          <a:p>
-            <a:r>
-              <a:rPr lang="en-US" dirty="0" smtClean="0"/>
-              <a:t>Entity Group Transaction – Provide Limited form of ACID in a single Partition</a:t>
-            </a:r>
-          </a:p>
-          <a:p>
-            <a:pPr marL="0" indent="0">
-              <a:buNone/>
-            </a:pPr>
-            <a:endParaRPr lang="en-US" dirty="0"/>
-          </a:p>
-          <a:p>
-            <a:r>
-              <a:rPr lang="en-US" dirty="0" smtClean="0"/>
-              <a:t>Partition Size: Too Big, Too Small, Just Right ( Scale </a:t>
-            </a:r>
+        <p:spPr>
+          <a:xfrm>
+            <a:off x="838200" y="1825625"/>
+            <a:ext cx="5671305" cy="4351338"/>
+          </a:xfrm>
+        </p:spPr>
+        <p:txBody>
+          <a:bodyPr>
+            <a:normAutofit fontScale="92500" lnSpcReduction="20000"/>
+          </a:bodyPr>
+          <a:lstStyle/>
+          <a:p>
+            <a:r>
+              <a:rPr lang="en-US" dirty="0" smtClean="0"/>
+              <a:t>Name, Value Pair </a:t>
+            </a:r>
+          </a:p>
+          <a:p>
+            <a:r>
+              <a:rPr lang="en-US" dirty="0" smtClean="0"/>
+              <a:t>Name is the row of a column.</a:t>
+            </a:r>
+          </a:p>
+          <a:p>
+            <a:endParaRPr lang="en-US" dirty="0"/>
+          </a:p>
+          <a:p>
+            <a:r>
+              <a:rPr lang="en-US" dirty="0" smtClean="0"/>
+              <a:t>Data Types </a:t>
+            </a:r>
+          </a:p>
+          <a:p>
+            <a:pPr lvl="1"/>
+            <a:r>
+              <a:rPr lang="en-US" dirty="0" smtClean="0"/>
+              <a:t>Byte[] – Up to 64 KB</a:t>
+            </a:r>
+          </a:p>
+          <a:p>
+            <a:pPr lvl="1"/>
             <a:r>
               <a:rPr lang="en-US" dirty="0" err="1" smtClean="0"/>
-              <a:t>vs</a:t>
-            </a:r>
-            <a:r>
-              <a:rPr lang="en-US" dirty="0" smtClean="0"/>
-              <a:t> Consistency )</a:t>
-            </a:r>
+              <a:t>Bool</a:t>
+            </a:r>
+            <a:endParaRPr lang="en-US" dirty="0" smtClean="0"/>
+          </a:p>
+          <a:p>
+            <a:pPr lvl="1"/>
+            <a:r>
+              <a:rPr lang="en-US" dirty="0" err="1" smtClean="0"/>
+              <a:t>DateTime</a:t>
+            </a:r>
+            <a:endParaRPr lang="en-US" dirty="0" smtClean="0"/>
+          </a:p>
+          <a:p>
+            <a:pPr lvl="1"/>
+            <a:r>
+              <a:rPr lang="en-US" dirty="0" smtClean="0"/>
+              <a:t>Double</a:t>
+            </a:r>
+          </a:p>
+          <a:p>
+            <a:pPr lvl="1"/>
+            <a:r>
+              <a:rPr lang="en-US" dirty="0" err="1" smtClean="0"/>
+              <a:t>Guid</a:t>
+            </a:r>
+            <a:endParaRPr lang="en-US" dirty="0" smtClean="0"/>
+          </a:p>
+          <a:p>
+            <a:pPr lvl="1"/>
+            <a:r>
+              <a:rPr lang="en-US" dirty="0" smtClean="0"/>
+              <a:t>Int32</a:t>
+            </a:r>
+          </a:p>
+          <a:p>
+            <a:pPr lvl="1"/>
+            <a:r>
+              <a:rPr lang="en-US" dirty="0" smtClean="0"/>
+              <a:t>Int64</a:t>
+            </a:r>
+          </a:p>
+          <a:p>
+            <a:pPr lvl="1"/>
+            <a:r>
+              <a:rPr lang="en-US" dirty="0" smtClean="0"/>
+              <a:t>String – UTF 16 encoded value up to 64 KB  </a:t>
+            </a:r>
+          </a:p>
+          <a:p>
+            <a:endParaRPr lang="en-US" dirty="0"/>
+          </a:p>
+        </p:txBody>
+      </p:sp>
+      <p:sp>
+        <p:nvSpPr>
+          <p:cNvPr id="6" name="TextBox 5"/>
+          <p:cNvSpPr txBox="1"/>
+          <p:nvPr/>
+        </p:nvSpPr>
+        <p:spPr>
+          <a:xfrm>
+            <a:off x="6694943" y="1969477"/>
+            <a:ext cx="5064369" cy="3693319"/>
+          </a:xfrm>
+          <a:prstGeom prst="rect">
+            <a:avLst/>
+          </a:prstGeom>
+          <a:noFill/>
+        </p:spPr>
+        <p:txBody>
+          <a:bodyPr wrap="square" rtlCol="0">
+            <a:spAutoFit/>
+          </a:bodyPr>
+          <a:lstStyle/>
+          <a:p>
+            <a:r>
+              <a:rPr lang="en-US" dirty="0" smtClean="0"/>
+              <a:t>SQL Data Types</a:t>
+            </a:r>
+          </a:p>
+          <a:p>
+            <a:pPr marL="285750" indent="-285750">
+              <a:buFont typeface="Arial" panose="020B0604020202020204" pitchFamily="34" charset="0"/>
+              <a:buChar char="•"/>
+            </a:pPr>
+            <a:r>
+              <a:rPr lang="en-US" dirty="0" err="1" smtClean="0"/>
+              <a:t>BigInt</a:t>
+            </a:r>
+            <a:endParaRPr lang="en-US" dirty="0" smtClean="0"/>
+          </a:p>
+          <a:p>
+            <a:pPr marL="285750" indent="-285750">
+              <a:buFont typeface="Arial" panose="020B0604020202020204" pitchFamily="34" charset="0"/>
+              <a:buChar char="•"/>
+            </a:pPr>
+            <a:r>
+              <a:rPr lang="en-US" dirty="0" err="1" smtClean="0"/>
+              <a:t>Int</a:t>
+            </a:r>
+            <a:endParaRPr lang="en-US" dirty="0" smtClean="0"/>
+          </a:p>
+          <a:p>
+            <a:pPr marL="285750" indent="-285750">
+              <a:buFont typeface="Arial" panose="020B0604020202020204" pitchFamily="34" charset="0"/>
+              <a:buChar char="•"/>
+            </a:pPr>
+            <a:r>
+              <a:rPr lang="en-US" dirty="0" err="1" smtClean="0"/>
+              <a:t>SmallInt</a:t>
+            </a:r>
+            <a:endParaRPr lang="en-US" dirty="0" smtClean="0"/>
+          </a:p>
+          <a:p>
+            <a:pPr marL="285750" indent="-285750">
+              <a:buFont typeface="Arial" panose="020B0604020202020204" pitchFamily="34" charset="0"/>
+              <a:buChar char="•"/>
+            </a:pPr>
+            <a:r>
+              <a:rPr lang="en-US" dirty="0" err="1" smtClean="0"/>
+              <a:t>TinyInt</a:t>
+            </a:r>
+            <a:endParaRPr lang="en-US" dirty="0" smtClean="0"/>
+          </a:p>
+          <a:p>
+            <a:pPr marL="285750" indent="-285750">
+              <a:buFont typeface="Arial" panose="020B0604020202020204" pitchFamily="34" charset="0"/>
+              <a:buChar char="•"/>
+            </a:pPr>
+            <a:r>
+              <a:rPr lang="en-US" dirty="0" smtClean="0"/>
+              <a:t>Bit</a:t>
+            </a:r>
+          </a:p>
+          <a:p>
+            <a:pPr marL="285750" indent="-285750">
+              <a:buFont typeface="Arial" panose="020B0604020202020204" pitchFamily="34" charset="0"/>
+              <a:buChar char="•"/>
+            </a:pPr>
+            <a:r>
+              <a:rPr lang="en-US" dirty="0" smtClean="0"/>
+              <a:t>Money</a:t>
+            </a:r>
+          </a:p>
+          <a:p>
+            <a:pPr marL="285750" indent="-285750">
+              <a:buFont typeface="Arial" panose="020B0604020202020204" pitchFamily="34" charset="0"/>
+              <a:buChar char="•"/>
+            </a:pPr>
+            <a:r>
+              <a:rPr lang="en-US" dirty="0" err="1" smtClean="0"/>
+              <a:t>SmallMoney</a:t>
+            </a:r>
+            <a:endParaRPr lang="en-US" dirty="0" smtClean="0"/>
+          </a:p>
+          <a:p>
+            <a:pPr marL="285750" indent="-285750">
+              <a:buFont typeface="Arial" panose="020B0604020202020204" pitchFamily="34" charset="0"/>
+              <a:buChar char="•"/>
+            </a:pPr>
+            <a:r>
+              <a:rPr lang="en-US" dirty="0" smtClean="0"/>
+              <a:t>Numeric</a:t>
+            </a:r>
+          </a:p>
+          <a:p>
+            <a:pPr marL="285750" indent="-285750">
+              <a:buFont typeface="Arial" panose="020B0604020202020204" pitchFamily="34" charset="0"/>
+              <a:buChar char="•"/>
+            </a:pPr>
+            <a:r>
+              <a:rPr lang="en-US" dirty="0" smtClean="0"/>
+              <a:t>Float</a:t>
+            </a:r>
+          </a:p>
+          <a:p>
+            <a:pPr marL="285750" indent="-285750">
+              <a:buFont typeface="Arial" panose="020B0604020202020204" pitchFamily="34" charset="0"/>
+              <a:buChar char="•"/>
+            </a:pPr>
+            <a:r>
+              <a:rPr lang="en-US" dirty="0" smtClean="0"/>
+              <a:t>Decimal</a:t>
+            </a:r>
+          </a:p>
+          <a:p>
+            <a:pPr marL="285750" indent="-285750">
+              <a:buFont typeface="Arial" panose="020B0604020202020204" pitchFamily="34" charset="0"/>
+              <a:buChar char="•"/>
+            </a:pPr>
+            <a:endParaRPr lang="en-US" dirty="0" smtClean="0"/>
+          </a:p>
+          <a:p>
+            <a:endParaRPr lang="en-US" dirty="0"/>
           </a:p>
         </p:txBody>
       </p:sp>
     </p:spTree>
     <p:extLst>
       <p:ext uri="{BB962C8B-B14F-4D97-AF65-F5344CB8AC3E}">
-        <p14:creationId xmlns:p14="http://schemas.microsoft.com/office/powerpoint/2010/main" val="558695033"/>
+        <p14:creationId xmlns:p14="http://schemas.microsoft.com/office/powerpoint/2010/main" val="3186164249"/>
       </p:ext>
     </p:extLst>
   </p:cSld>

</xml_diff>